<commit_message>
Prepared class "TimeSelection" for future use with diagnostics. Need to wait for diag improvements.
</commit_message>
<xml_diff>
--- a/doc/Sphinx/Profiles.pptx
+++ b/doc/Sphinx/Profiles.pptx
@@ -7,6 +7,7 @@
   <p:sldIdLst>
     <p:sldId id="256" r:id="rId2"/>
     <p:sldId id="257" r:id="rId3"/>
+    <p:sldId id="258" r:id="rId4"/>
   </p:sldIdLst>
   <p:sldSz cx="9144000" cy="6858000" type="screen4x3"/>
   <p:notesSz cx="6858000" cy="9144000"/>
@@ -105,6 +106,22 @@
       </a:defRPr>
     </a:lvl9pPr>
   </p:defaultTextStyle>
+  <p:extLst>
+    <p:ext uri="{EFAFB233-063F-42B5-8137-9DF3F51BA10A}">
+      <p15:sldGuideLst xmlns:p15="http://schemas.microsoft.com/office/powerpoint/2012/main">
+        <p15:guide id="1" orient="horz" pos="2160">
+          <p15:clr>
+            <a:srgbClr val="A4A3A4"/>
+          </p15:clr>
+        </p15:guide>
+        <p15:guide id="2" pos="2880">
+          <p15:clr>
+            <a:srgbClr val="A4A3A4"/>
+          </p15:clr>
+        </p15:guide>
+      </p15:sldGuideLst>
+    </p:ext>
+  </p:extLst>
 </p:presentation>
 </file>
 
@@ -289,7 +306,7 @@
           <a:p>
             <a:fld id="{F1229E41-CA26-2F4E-8441-D62FD830A7AB}" type="datetimeFigureOut">
               <a:rPr lang="fr-FR" smtClean="0"/>
-              <a:t>15/09/15</a:t>
+              <a:t>16/02/2016</a:t>
             </a:fld>
             <a:endParaRPr lang="fr-FR"/>
           </a:p>
@@ -459,7 +476,7 @@
           <a:p>
             <a:fld id="{F1229E41-CA26-2F4E-8441-D62FD830A7AB}" type="datetimeFigureOut">
               <a:rPr lang="fr-FR" smtClean="0"/>
-              <a:t>15/09/15</a:t>
+              <a:t>16/02/2016</a:t>
             </a:fld>
             <a:endParaRPr lang="fr-FR"/>
           </a:p>
@@ -639,7 +656,7 @@
           <a:p>
             <a:fld id="{F1229E41-CA26-2F4E-8441-D62FD830A7AB}" type="datetimeFigureOut">
               <a:rPr lang="fr-FR" smtClean="0"/>
-              <a:t>15/09/15</a:t>
+              <a:t>16/02/2016</a:t>
             </a:fld>
             <a:endParaRPr lang="fr-FR"/>
           </a:p>
@@ -809,7 +826,7 @@
           <a:p>
             <a:fld id="{F1229E41-CA26-2F4E-8441-D62FD830A7AB}" type="datetimeFigureOut">
               <a:rPr lang="fr-FR" smtClean="0"/>
-              <a:t>15/09/15</a:t>
+              <a:t>16/02/2016</a:t>
             </a:fld>
             <a:endParaRPr lang="fr-FR"/>
           </a:p>
@@ -1055,7 +1072,7 @@
           <a:p>
             <a:fld id="{F1229E41-CA26-2F4E-8441-D62FD830A7AB}" type="datetimeFigureOut">
               <a:rPr lang="fr-FR" smtClean="0"/>
-              <a:t>15/09/15</a:t>
+              <a:t>16/02/2016</a:t>
             </a:fld>
             <a:endParaRPr lang="fr-FR"/>
           </a:p>
@@ -1343,7 +1360,7 @@
           <a:p>
             <a:fld id="{F1229E41-CA26-2F4E-8441-D62FD830A7AB}" type="datetimeFigureOut">
               <a:rPr lang="fr-FR" smtClean="0"/>
-              <a:t>15/09/15</a:t>
+              <a:t>16/02/2016</a:t>
             </a:fld>
             <a:endParaRPr lang="fr-FR"/>
           </a:p>
@@ -1765,7 +1782,7 @@
           <a:p>
             <a:fld id="{F1229E41-CA26-2F4E-8441-D62FD830A7AB}" type="datetimeFigureOut">
               <a:rPr lang="fr-FR" smtClean="0"/>
-              <a:t>15/09/15</a:t>
+              <a:t>16/02/2016</a:t>
             </a:fld>
             <a:endParaRPr lang="fr-FR"/>
           </a:p>
@@ -1883,7 +1900,7 @@
           <a:p>
             <a:fld id="{F1229E41-CA26-2F4E-8441-D62FD830A7AB}" type="datetimeFigureOut">
               <a:rPr lang="fr-FR" smtClean="0"/>
-              <a:t>15/09/15</a:t>
+              <a:t>16/02/2016</a:t>
             </a:fld>
             <a:endParaRPr lang="fr-FR"/>
           </a:p>
@@ -1978,7 +1995,7 @@
           <a:p>
             <a:fld id="{F1229E41-CA26-2F4E-8441-D62FD830A7AB}" type="datetimeFigureOut">
               <a:rPr lang="fr-FR" smtClean="0"/>
-              <a:t>15/09/15</a:t>
+              <a:t>16/02/2016</a:t>
             </a:fld>
             <a:endParaRPr lang="fr-FR"/>
           </a:p>
@@ -2255,7 +2272,7 @@
           <a:p>
             <a:fld id="{F1229E41-CA26-2F4E-8441-D62FD830A7AB}" type="datetimeFigureOut">
               <a:rPr lang="fr-FR" smtClean="0"/>
-              <a:t>15/09/15</a:t>
+              <a:t>16/02/2016</a:t>
             </a:fld>
             <a:endParaRPr lang="fr-FR"/>
           </a:p>
@@ -2508,7 +2525,7 @@
           <a:p>
             <a:fld id="{F1229E41-CA26-2F4E-8441-D62FD830A7AB}" type="datetimeFigureOut">
               <a:rPr lang="fr-FR" smtClean="0"/>
-              <a:t>15/09/15</a:t>
+              <a:t>16/02/2016</a:t>
             </a:fld>
             <a:endParaRPr lang="fr-FR"/>
           </a:p>
@@ -2721,7 +2738,7 @@
           <a:p>
             <a:fld id="{F1229E41-CA26-2F4E-8441-D62FD830A7AB}" type="datetimeFigureOut">
               <a:rPr lang="fr-FR" smtClean="0"/>
-              <a:t>15/09/15</a:t>
+              <a:t>16/02/2016</a:t>
             </a:fld>
             <a:endParaRPr lang="fr-FR"/>
           </a:p>
@@ -12397,17 +12414,7 @@
                 <a:latin typeface="Courier"/>
                 <a:cs typeface="Courier"/>
               </a:rPr>
-              <a:t>points</a:t>
-            </a:r>
-            <a:r>
-              <a:rPr lang="fr-FR" sz="1400" dirty="0" smtClean="0">
-                <a:solidFill>
-                  <a:srgbClr val="0000FF"/>
-                </a:solidFill>
-                <a:latin typeface="Courier"/>
-                <a:cs typeface="Courier"/>
-              </a:rPr>
-              <a:t>[0]</a:t>
+              <a:t>points[0]</a:t>
             </a:r>
             <a:endParaRPr lang="fr-FR" sz="1400" dirty="0">
               <a:solidFill>
@@ -12450,17 +12457,7 @@
                 <a:latin typeface="Courier"/>
                 <a:cs typeface="Courier"/>
               </a:rPr>
-              <a:t>points</a:t>
-            </a:r>
-            <a:r>
-              <a:rPr lang="fr-FR" sz="1400" dirty="0" smtClean="0">
-                <a:solidFill>
-                  <a:srgbClr val="0000FF"/>
-                </a:solidFill>
-                <a:latin typeface="Courier"/>
-                <a:cs typeface="Courier"/>
-              </a:rPr>
-              <a:t>[1]</a:t>
+              <a:t>points[1]</a:t>
             </a:r>
             <a:endParaRPr lang="fr-FR" sz="1400" dirty="0">
               <a:solidFill>
@@ -12503,17 +12500,7 @@
                 <a:latin typeface="Courier"/>
                 <a:cs typeface="Courier"/>
               </a:rPr>
-              <a:t>points</a:t>
-            </a:r>
-            <a:r>
-              <a:rPr lang="fr-FR" sz="1400" dirty="0" smtClean="0">
-                <a:solidFill>
-                  <a:srgbClr val="0000FF"/>
-                </a:solidFill>
-                <a:latin typeface="Courier"/>
-                <a:cs typeface="Courier"/>
-              </a:rPr>
-              <a:t>[2]</a:t>
+              <a:t>points[2]</a:t>
             </a:r>
             <a:endParaRPr lang="fr-FR" sz="1400" dirty="0">
               <a:solidFill>
@@ -12556,17 +12543,7 @@
                 <a:latin typeface="Courier"/>
                 <a:cs typeface="Courier"/>
               </a:rPr>
-              <a:t>values</a:t>
-            </a:r>
-            <a:r>
-              <a:rPr lang="fr-FR" sz="1400" dirty="0" smtClean="0">
-                <a:solidFill>
-                  <a:srgbClr val="0000FF"/>
-                </a:solidFill>
-                <a:latin typeface="Courier"/>
-                <a:cs typeface="Courier"/>
-              </a:rPr>
-              <a:t>[</a:t>
+              <a:t>values[</a:t>
             </a:r>
             <a:r>
               <a:rPr lang="fr-FR" sz="1400" dirty="0">
@@ -12629,17 +12606,7 @@
                 <a:latin typeface="Courier"/>
                 <a:cs typeface="Courier"/>
               </a:rPr>
-              <a:t>values</a:t>
-            </a:r>
-            <a:r>
-              <a:rPr lang="fr-FR" sz="1400" dirty="0" smtClean="0">
-                <a:solidFill>
-                  <a:srgbClr val="0000FF"/>
-                </a:solidFill>
-                <a:latin typeface="Courier"/>
-                <a:cs typeface="Courier"/>
-              </a:rPr>
-              <a:t>[1]</a:t>
+              <a:t>values[1]</a:t>
             </a:r>
             <a:endParaRPr lang="fr-FR" sz="1400" dirty="0">
               <a:solidFill>
@@ -12682,17 +12649,7 @@
                 <a:latin typeface="Courier"/>
                 <a:cs typeface="Courier"/>
               </a:rPr>
-              <a:t>values</a:t>
-            </a:r>
-            <a:r>
-              <a:rPr lang="fr-FR" sz="1400" dirty="0" smtClean="0">
-                <a:solidFill>
-                  <a:srgbClr val="0000FF"/>
-                </a:solidFill>
-                <a:latin typeface="Courier"/>
-                <a:cs typeface="Courier"/>
-              </a:rPr>
-              <a:t>[2]</a:t>
+              <a:t>values[2]</a:t>
             </a:r>
             <a:endParaRPr lang="fr-FR" sz="1400" dirty="0">
               <a:solidFill>
@@ -15231,6 +15188,3251 @@
 </p:sld>
 </file>
 
+<file path=ppt/slides/slide3.xml><?xml version="1.0" encoding="utf-8"?>
+<p:sld xmlns:a="http://schemas.openxmlformats.org/drawingml/2006/main" xmlns:r="http://schemas.openxmlformats.org/officeDocument/2006/relationships" xmlns:p="http://schemas.openxmlformats.org/presentationml/2006/main">
+  <p:cSld>
+    <p:spTree>
+      <p:nvGrpSpPr>
+        <p:cNvPr id="1" name=""/>
+        <p:cNvGrpSpPr/>
+        <p:nvPr/>
+      </p:nvGrpSpPr>
+      <p:grpSpPr>
+        <a:xfrm>
+          <a:off x="0" y="0"/>
+          <a:ext cx="0" cy="0"/>
+          <a:chOff x="0" y="0"/>
+          <a:chExt cx="0" cy="0"/>
+        </a:xfrm>
+      </p:grpSpPr>
+      <p:cxnSp>
+        <p:nvCxnSpPr>
+          <p:cNvPr id="148" name="Connecteur droit 147"/>
+          <p:cNvCxnSpPr/>
+          <p:nvPr/>
+        </p:nvCxnSpPr>
+        <p:spPr>
+          <a:xfrm>
+            <a:off x="694633" y="1591149"/>
+            <a:ext cx="0" cy="4035187"/>
+          </a:xfrm>
+          <a:prstGeom prst="line">
+            <a:avLst/>
+          </a:prstGeom>
+          <a:ln w="25400">
+            <a:solidFill>
+              <a:schemeClr val="bg1">
+                <a:lumMod val="50000"/>
+              </a:schemeClr>
+            </a:solidFill>
+            <a:prstDash val="sysDot"/>
+          </a:ln>
+          <a:effectLst/>
+        </p:spPr>
+        <p:style>
+          <a:lnRef idx="2">
+            <a:schemeClr val="accent1"/>
+          </a:lnRef>
+          <a:fillRef idx="0">
+            <a:schemeClr val="accent1"/>
+          </a:fillRef>
+          <a:effectRef idx="1">
+            <a:schemeClr val="accent1"/>
+          </a:effectRef>
+          <a:fontRef idx="minor">
+            <a:schemeClr val="tx1"/>
+          </a:fontRef>
+        </p:style>
+      </p:cxnSp>
+      <p:sp>
+        <p:nvSpPr>
+          <p:cNvPr id="57" name="ZoneTexte 56"/>
+          <p:cNvSpPr txBox="1"/>
+          <p:nvPr/>
+        </p:nvSpPr>
+        <p:spPr>
+          <a:xfrm>
+            <a:off x="689974" y="2553190"/>
+            <a:ext cx="817853" cy="369332"/>
+          </a:xfrm>
+          <a:prstGeom prst="rect">
+            <a:avLst/>
+          </a:prstGeom>
+          <a:noFill/>
+        </p:spPr>
+        <p:txBody>
+          <a:bodyPr wrap="none" rtlCol="0">
+            <a:spAutoFit/>
+          </a:bodyPr>
+          <a:lstStyle/>
+          <a:p>
+            <a:r>
+              <a:rPr lang="fr-FR" dirty="0" err="1" smtClean="0">
+                <a:solidFill>
+                  <a:srgbClr val="00B050"/>
+                </a:solidFill>
+                <a:latin typeface="Consolas" charset="0"/>
+                <a:ea typeface="Consolas" charset="0"/>
+                <a:cs typeface="Consolas" charset="0"/>
+              </a:rPr>
+              <a:t>start</a:t>
+            </a:r>
+            <a:endParaRPr lang="fr-FR" dirty="0">
+              <a:solidFill>
+                <a:srgbClr val="00B050"/>
+              </a:solidFill>
+              <a:latin typeface="Consolas" charset="0"/>
+              <a:ea typeface="Consolas" charset="0"/>
+              <a:cs typeface="Consolas" charset="0"/>
+            </a:endParaRPr>
+          </a:p>
+        </p:txBody>
+      </p:sp>
+      <p:cxnSp>
+        <p:nvCxnSpPr>
+          <p:cNvPr id="5" name="Connecteur droit 4"/>
+          <p:cNvCxnSpPr/>
+          <p:nvPr/>
+        </p:nvCxnSpPr>
+        <p:spPr>
+          <a:xfrm>
+            <a:off x="700196" y="1593249"/>
+            <a:ext cx="8151703" cy="0"/>
+          </a:xfrm>
+          <a:prstGeom prst="line">
+            <a:avLst/>
+          </a:prstGeom>
+          <a:ln w="31750">
+            <a:solidFill>
+              <a:schemeClr val="tx1"/>
+            </a:solidFill>
+            <a:headEnd type="oval" w="sm" len="sm"/>
+            <a:tailEnd type="triangle"/>
+          </a:ln>
+          <a:effectLst/>
+        </p:spPr>
+        <p:style>
+          <a:lnRef idx="2">
+            <a:schemeClr val="accent1"/>
+          </a:lnRef>
+          <a:fillRef idx="0">
+            <a:schemeClr val="accent1"/>
+          </a:fillRef>
+          <a:effectRef idx="1">
+            <a:schemeClr val="accent1"/>
+          </a:effectRef>
+          <a:fontRef idx="minor">
+            <a:schemeClr val="tx1"/>
+          </a:fontRef>
+        </p:style>
+      </p:cxnSp>
+      <p:sp>
+        <p:nvSpPr>
+          <p:cNvPr id="6" name="ZoneTexte 5"/>
+          <p:cNvSpPr txBox="1"/>
+          <p:nvPr/>
+        </p:nvSpPr>
+        <p:spPr>
+          <a:xfrm>
+            <a:off x="557999" y="1196811"/>
+            <a:ext cx="328936" cy="461665"/>
+          </a:xfrm>
+          <a:prstGeom prst="rect">
+            <a:avLst/>
+          </a:prstGeom>
+          <a:noFill/>
+        </p:spPr>
+        <p:txBody>
+          <a:bodyPr wrap="none" rtlCol="0">
+            <a:spAutoFit/>
+          </a:bodyPr>
+          <a:lstStyle/>
+          <a:p>
+            <a:r>
+              <a:rPr lang="fr-FR" sz="2400" dirty="0" smtClean="0">
+                <a:latin typeface="Garamond" charset="0"/>
+                <a:ea typeface="Garamond" charset="0"/>
+                <a:cs typeface="Garamond" charset="0"/>
+              </a:rPr>
+              <a:t>0</a:t>
+            </a:r>
+            <a:endParaRPr lang="fr-FR" sz="2400" dirty="0">
+              <a:latin typeface="Garamond" charset="0"/>
+              <a:ea typeface="Garamond" charset="0"/>
+              <a:cs typeface="Garamond" charset="0"/>
+            </a:endParaRPr>
+          </a:p>
+        </p:txBody>
+      </p:sp>
+      <p:sp>
+        <p:nvSpPr>
+          <p:cNvPr id="7" name="ZoneTexte 6"/>
+          <p:cNvSpPr txBox="1"/>
+          <p:nvPr/>
+        </p:nvSpPr>
+        <p:spPr>
+          <a:xfrm>
+            <a:off x="7335607" y="1138911"/>
+            <a:ext cx="1313693" cy="461665"/>
+          </a:xfrm>
+          <a:prstGeom prst="rect">
+            <a:avLst/>
+          </a:prstGeom>
+          <a:noFill/>
+        </p:spPr>
+        <p:txBody>
+          <a:bodyPr wrap="none" rtlCol="0">
+            <a:spAutoFit/>
+          </a:bodyPr>
+          <a:lstStyle/>
+          <a:p>
+            <a:r>
+              <a:rPr lang="fr-FR" sz="2400" dirty="0" err="1" smtClean="0">
+                <a:latin typeface="Garamond" charset="0"/>
+                <a:ea typeface="Garamond" charset="0"/>
+                <a:cs typeface="Garamond" charset="0"/>
+              </a:rPr>
+              <a:t>timesteps</a:t>
+            </a:r>
+            <a:endParaRPr lang="fr-FR" sz="2400" dirty="0">
+              <a:latin typeface="Garamond" charset="0"/>
+              <a:ea typeface="Garamond" charset="0"/>
+              <a:cs typeface="Garamond" charset="0"/>
+            </a:endParaRPr>
+          </a:p>
+        </p:txBody>
+      </p:sp>
+      <p:cxnSp>
+        <p:nvCxnSpPr>
+          <p:cNvPr id="9" name="Connecteur droit 8"/>
+          <p:cNvCxnSpPr/>
+          <p:nvPr/>
+        </p:nvCxnSpPr>
+        <p:spPr>
+          <a:xfrm>
+            <a:off x="700196" y="1769470"/>
+            <a:ext cx="0" cy="377143"/>
+          </a:xfrm>
+          <a:prstGeom prst="line">
+            <a:avLst/>
+          </a:prstGeom>
+          <a:ln w="31750">
+            <a:solidFill>
+              <a:srgbClr val="C00000"/>
+            </a:solidFill>
+          </a:ln>
+          <a:effectLst/>
+        </p:spPr>
+        <p:style>
+          <a:lnRef idx="2">
+            <a:schemeClr val="accent1"/>
+          </a:lnRef>
+          <a:fillRef idx="0">
+            <a:schemeClr val="accent1"/>
+          </a:fillRef>
+          <a:effectRef idx="1">
+            <a:schemeClr val="accent1"/>
+          </a:effectRef>
+          <a:fontRef idx="minor">
+            <a:schemeClr val="tx1"/>
+          </a:fontRef>
+        </p:style>
+      </p:cxnSp>
+      <p:cxnSp>
+        <p:nvCxnSpPr>
+          <p:cNvPr id="10" name="Connecteur droit 9"/>
+          <p:cNvCxnSpPr/>
+          <p:nvPr/>
+        </p:nvCxnSpPr>
+        <p:spPr>
+          <a:xfrm>
+            <a:off x="2493900" y="1769470"/>
+            <a:ext cx="0" cy="377143"/>
+          </a:xfrm>
+          <a:prstGeom prst="line">
+            <a:avLst/>
+          </a:prstGeom>
+          <a:ln w="31750">
+            <a:solidFill>
+              <a:srgbClr val="C00000"/>
+            </a:solidFill>
+          </a:ln>
+          <a:effectLst/>
+        </p:spPr>
+        <p:style>
+          <a:lnRef idx="2">
+            <a:schemeClr val="accent1"/>
+          </a:lnRef>
+          <a:fillRef idx="0">
+            <a:schemeClr val="accent1"/>
+          </a:fillRef>
+          <a:effectRef idx="1">
+            <a:schemeClr val="accent1"/>
+          </a:effectRef>
+          <a:fontRef idx="minor">
+            <a:schemeClr val="tx1"/>
+          </a:fontRef>
+        </p:style>
+      </p:cxnSp>
+      <p:cxnSp>
+        <p:nvCxnSpPr>
+          <p:cNvPr id="22" name="Connecteur droit 21"/>
+          <p:cNvCxnSpPr/>
+          <p:nvPr/>
+        </p:nvCxnSpPr>
+        <p:spPr>
+          <a:xfrm>
+            <a:off x="4289404" y="1769470"/>
+            <a:ext cx="0" cy="377143"/>
+          </a:xfrm>
+          <a:prstGeom prst="line">
+            <a:avLst/>
+          </a:prstGeom>
+          <a:ln w="31750">
+            <a:solidFill>
+              <a:srgbClr val="C00000"/>
+            </a:solidFill>
+          </a:ln>
+          <a:effectLst/>
+        </p:spPr>
+        <p:style>
+          <a:lnRef idx="2">
+            <a:schemeClr val="accent1"/>
+          </a:lnRef>
+          <a:fillRef idx="0">
+            <a:schemeClr val="accent1"/>
+          </a:fillRef>
+          <a:effectRef idx="1">
+            <a:schemeClr val="accent1"/>
+          </a:effectRef>
+          <a:fontRef idx="minor">
+            <a:schemeClr val="tx1"/>
+          </a:fontRef>
+        </p:style>
+      </p:cxnSp>
+      <p:cxnSp>
+        <p:nvCxnSpPr>
+          <p:cNvPr id="23" name="Connecteur droit 22"/>
+          <p:cNvCxnSpPr/>
+          <p:nvPr/>
+        </p:nvCxnSpPr>
+        <p:spPr>
+          <a:xfrm>
+            <a:off x="6083107" y="1769470"/>
+            <a:ext cx="0" cy="377143"/>
+          </a:xfrm>
+          <a:prstGeom prst="line">
+            <a:avLst/>
+          </a:prstGeom>
+          <a:ln w="31750">
+            <a:solidFill>
+              <a:srgbClr val="C00000"/>
+            </a:solidFill>
+          </a:ln>
+          <a:effectLst/>
+        </p:spPr>
+        <p:style>
+          <a:lnRef idx="2">
+            <a:schemeClr val="accent1"/>
+          </a:lnRef>
+          <a:fillRef idx="0">
+            <a:schemeClr val="accent1"/>
+          </a:fillRef>
+          <a:effectRef idx="1">
+            <a:schemeClr val="accent1"/>
+          </a:effectRef>
+          <a:fontRef idx="minor">
+            <a:schemeClr val="tx1"/>
+          </a:fontRef>
+        </p:style>
+      </p:cxnSp>
+      <p:cxnSp>
+        <p:nvCxnSpPr>
+          <p:cNvPr id="26" name="Connecteur droit 25"/>
+          <p:cNvCxnSpPr/>
+          <p:nvPr/>
+        </p:nvCxnSpPr>
+        <p:spPr>
+          <a:xfrm>
+            <a:off x="7878611" y="1769470"/>
+            <a:ext cx="0" cy="377143"/>
+          </a:xfrm>
+          <a:prstGeom prst="line">
+            <a:avLst/>
+          </a:prstGeom>
+          <a:ln w="31750">
+            <a:solidFill>
+              <a:srgbClr val="C00000"/>
+            </a:solidFill>
+          </a:ln>
+          <a:effectLst/>
+        </p:spPr>
+        <p:style>
+          <a:lnRef idx="2">
+            <a:schemeClr val="accent1"/>
+          </a:lnRef>
+          <a:fillRef idx="0">
+            <a:schemeClr val="accent1"/>
+          </a:fillRef>
+          <a:effectRef idx="1">
+            <a:schemeClr val="accent1"/>
+          </a:effectRef>
+          <a:fontRef idx="minor">
+            <a:schemeClr val="tx1"/>
+          </a:fontRef>
+        </p:style>
+      </p:cxnSp>
+      <p:cxnSp>
+        <p:nvCxnSpPr>
+          <p:cNvPr id="29" name="Connecteur droit avec flèche 28"/>
+          <p:cNvCxnSpPr/>
+          <p:nvPr/>
+        </p:nvCxnSpPr>
+        <p:spPr>
+          <a:xfrm>
+            <a:off x="700196" y="1855245"/>
+            <a:ext cx="1793704" cy="0"/>
+          </a:xfrm>
+          <a:prstGeom prst="straightConnector1">
+            <a:avLst/>
+          </a:prstGeom>
+          <a:ln w="31750">
+            <a:solidFill>
+              <a:srgbClr val="0070C0"/>
+            </a:solidFill>
+            <a:headEnd type="triangle" w="med" len="med"/>
+            <a:tailEnd type="triangle" w="med" len="med"/>
+          </a:ln>
+          <a:effectLst/>
+        </p:spPr>
+        <p:style>
+          <a:lnRef idx="2">
+            <a:schemeClr val="accent1"/>
+          </a:lnRef>
+          <a:fillRef idx="0">
+            <a:schemeClr val="accent1"/>
+          </a:fillRef>
+          <a:effectRef idx="1">
+            <a:schemeClr val="accent1"/>
+          </a:effectRef>
+          <a:fontRef idx="minor">
+            <a:schemeClr val="tx1"/>
+          </a:fontRef>
+        </p:style>
+      </p:cxnSp>
+      <p:sp>
+        <p:nvSpPr>
+          <p:cNvPr id="31" name="ZoneTexte 30"/>
+          <p:cNvSpPr txBox="1"/>
+          <p:nvPr/>
+        </p:nvSpPr>
+        <p:spPr>
+          <a:xfrm>
+            <a:off x="1141572" y="1800938"/>
+            <a:ext cx="944488" cy="369332"/>
+          </a:xfrm>
+          <a:prstGeom prst="rect">
+            <a:avLst/>
+          </a:prstGeom>
+          <a:noFill/>
+        </p:spPr>
+        <p:txBody>
+          <a:bodyPr wrap="none" rtlCol="0">
+            <a:spAutoFit/>
+          </a:bodyPr>
+          <a:lstStyle/>
+          <a:p>
+            <a:r>
+              <a:rPr lang="fr-FR" dirty="0" err="1" smtClean="0">
+                <a:solidFill>
+                  <a:srgbClr val="0070C0"/>
+                </a:solidFill>
+                <a:latin typeface="Consolas" charset="0"/>
+                <a:ea typeface="Consolas" charset="0"/>
+                <a:cs typeface="Consolas" charset="0"/>
+              </a:rPr>
+              <a:t>period</a:t>
+            </a:r>
+            <a:endParaRPr lang="fr-FR" dirty="0">
+              <a:solidFill>
+                <a:srgbClr val="0070C0"/>
+              </a:solidFill>
+              <a:latin typeface="Consolas" charset="0"/>
+              <a:ea typeface="Consolas" charset="0"/>
+              <a:cs typeface="Consolas" charset="0"/>
+            </a:endParaRPr>
+          </a:p>
+        </p:txBody>
+      </p:sp>
+      <p:sp>
+        <p:nvSpPr>
+          <p:cNvPr id="55" name="ZoneTexte 54"/>
+          <p:cNvSpPr txBox="1"/>
+          <p:nvPr/>
+        </p:nvSpPr>
+        <p:spPr>
+          <a:xfrm>
+            <a:off x="1934651" y="2537922"/>
+            <a:ext cx="944489" cy="369332"/>
+          </a:xfrm>
+          <a:prstGeom prst="rect">
+            <a:avLst/>
+          </a:prstGeom>
+          <a:noFill/>
+        </p:spPr>
+        <p:txBody>
+          <a:bodyPr wrap="none" rtlCol="0">
+            <a:spAutoFit/>
+          </a:bodyPr>
+          <a:lstStyle/>
+          <a:p>
+            <a:r>
+              <a:rPr lang="fr-FR" smtClean="0">
+                <a:solidFill>
+                  <a:srgbClr val="0070C0"/>
+                </a:solidFill>
+                <a:latin typeface="Consolas" charset="0"/>
+                <a:ea typeface="Consolas" charset="0"/>
+                <a:cs typeface="Consolas" charset="0"/>
+              </a:rPr>
+              <a:t>period</a:t>
+            </a:r>
+            <a:endParaRPr lang="fr-FR" dirty="0">
+              <a:solidFill>
+                <a:srgbClr val="0070C0"/>
+              </a:solidFill>
+              <a:latin typeface="Consolas" charset="0"/>
+              <a:ea typeface="Consolas" charset="0"/>
+              <a:cs typeface="Consolas" charset="0"/>
+            </a:endParaRPr>
+          </a:p>
+        </p:txBody>
+      </p:sp>
+      <p:cxnSp>
+        <p:nvCxnSpPr>
+          <p:cNvPr id="48" name="Connecteur droit 47"/>
+          <p:cNvCxnSpPr/>
+          <p:nvPr/>
+        </p:nvCxnSpPr>
+        <p:spPr>
+          <a:xfrm>
+            <a:off x="1493274" y="2506454"/>
+            <a:ext cx="0" cy="377143"/>
+          </a:xfrm>
+          <a:prstGeom prst="line">
+            <a:avLst/>
+          </a:prstGeom>
+          <a:ln w="31750">
+            <a:solidFill>
+              <a:srgbClr val="C00000"/>
+            </a:solidFill>
+          </a:ln>
+          <a:effectLst/>
+        </p:spPr>
+        <p:style>
+          <a:lnRef idx="2">
+            <a:schemeClr val="accent1"/>
+          </a:lnRef>
+          <a:fillRef idx="0">
+            <a:schemeClr val="accent1"/>
+          </a:fillRef>
+          <a:effectRef idx="1">
+            <a:schemeClr val="accent1"/>
+          </a:effectRef>
+          <a:fontRef idx="minor">
+            <a:schemeClr val="tx1"/>
+          </a:fontRef>
+        </p:style>
+      </p:cxnSp>
+      <p:cxnSp>
+        <p:nvCxnSpPr>
+          <p:cNvPr id="49" name="Connecteur droit 48"/>
+          <p:cNvCxnSpPr/>
+          <p:nvPr/>
+        </p:nvCxnSpPr>
+        <p:spPr>
+          <a:xfrm>
+            <a:off x="3286979" y="2506454"/>
+            <a:ext cx="0" cy="377143"/>
+          </a:xfrm>
+          <a:prstGeom prst="line">
+            <a:avLst/>
+          </a:prstGeom>
+          <a:ln w="31750">
+            <a:solidFill>
+              <a:srgbClr val="C00000"/>
+            </a:solidFill>
+          </a:ln>
+          <a:effectLst/>
+        </p:spPr>
+        <p:style>
+          <a:lnRef idx="2">
+            <a:schemeClr val="accent1"/>
+          </a:lnRef>
+          <a:fillRef idx="0">
+            <a:schemeClr val="accent1"/>
+          </a:fillRef>
+          <a:effectRef idx="1">
+            <a:schemeClr val="accent1"/>
+          </a:effectRef>
+          <a:fontRef idx="minor">
+            <a:schemeClr val="tx1"/>
+          </a:fontRef>
+        </p:style>
+      </p:cxnSp>
+      <p:cxnSp>
+        <p:nvCxnSpPr>
+          <p:cNvPr id="50" name="Connecteur droit 49"/>
+          <p:cNvCxnSpPr/>
+          <p:nvPr/>
+        </p:nvCxnSpPr>
+        <p:spPr>
+          <a:xfrm>
+            <a:off x="5088754" y="2506454"/>
+            <a:ext cx="0" cy="377143"/>
+          </a:xfrm>
+          <a:prstGeom prst="line">
+            <a:avLst/>
+          </a:prstGeom>
+          <a:ln w="31750">
+            <a:solidFill>
+              <a:srgbClr val="C00000"/>
+            </a:solidFill>
+          </a:ln>
+          <a:effectLst/>
+        </p:spPr>
+        <p:style>
+          <a:lnRef idx="2">
+            <a:schemeClr val="accent1"/>
+          </a:lnRef>
+          <a:fillRef idx="0">
+            <a:schemeClr val="accent1"/>
+          </a:fillRef>
+          <a:effectRef idx="1">
+            <a:schemeClr val="accent1"/>
+          </a:effectRef>
+          <a:fontRef idx="minor">
+            <a:schemeClr val="tx1"/>
+          </a:fontRef>
+        </p:style>
+      </p:cxnSp>
+      <p:cxnSp>
+        <p:nvCxnSpPr>
+          <p:cNvPr id="51" name="Connecteur droit 50"/>
+          <p:cNvCxnSpPr/>
+          <p:nvPr/>
+        </p:nvCxnSpPr>
+        <p:spPr>
+          <a:xfrm>
+            <a:off x="6882458" y="2506454"/>
+            <a:ext cx="0" cy="377143"/>
+          </a:xfrm>
+          <a:prstGeom prst="line">
+            <a:avLst/>
+          </a:prstGeom>
+          <a:ln w="31750">
+            <a:solidFill>
+              <a:srgbClr val="C00000"/>
+            </a:solidFill>
+          </a:ln>
+          <a:effectLst/>
+        </p:spPr>
+        <p:style>
+          <a:lnRef idx="2">
+            <a:schemeClr val="accent1"/>
+          </a:lnRef>
+          <a:fillRef idx="0">
+            <a:schemeClr val="accent1"/>
+          </a:fillRef>
+          <a:effectRef idx="1">
+            <a:schemeClr val="accent1"/>
+          </a:effectRef>
+          <a:fontRef idx="minor">
+            <a:schemeClr val="tx1"/>
+          </a:fontRef>
+        </p:style>
+      </p:cxnSp>
+      <p:cxnSp>
+        <p:nvCxnSpPr>
+          <p:cNvPr id="52" name="Connecteur droit 51"/>
+          <p:cNvCxnSpPr/>
+          <p:nvPr/>
+        </p:nvCxnSpPr>
+        <p:spPr>
+          <a:xfrm>
+            <a:off x="8677962" y="2506454"/>
+            <a:ext cx="0" cy="377143"/>
+          </a:xfrm>
+          <a:prstGeom prst="line">
+            <a:avLst/>
+          </a:prstGeom>
+          <a:ln w="31750">
+            <a:solidFill>
+              <a:srgbClr val="C00000"/>
+            </a:solidFill>
+          </a:ln>
+          <a:effectLst/>
+        </p:spPr>
+        <p:style>
+          <a:lnRef idx="2">
+            <a:schemeClr val="accent1"/>
+          </a:lnRef>
+          <a:fillRef idx="0">
+            <a:schemeClr val="accent1"/>
+          </a:fillRef>
+          <a:effectRef idx="1">
+            <a:schemeClr val="accent1"/>
+          </a:effectRef>
+          <a:fontRef idx="minor">
+            <a:schemeClr val="tx1"/>
+          </a:fontRef>
+        </p:style>
+      </p:cxnSp>
+      <p:cxnSp>
+        <p:nvCxnSpPr>
+          <p:cNvPr id="54" name="Connecteur droit avec flèche 53"/>
+          <p:cNvCxnSpPr/>
+          <p:nvPr/>
+        </p:nvCxnSpPr>
+        <p:spPr>
+          <a:xfrm>
+            <a:off x="1493274" y="2592229"/>
+            <a:ext cx="1793704" cy="0"/>
+          </a:xfrm>
+          <a:prstGeom prst="straightConnector1">
+            <a:avLst/>
+          </a:prstGeom>
+          <a:ln w="31750">
+            <a:solidFill>
+              <a:srgbClr val="0070C0"/>
+            </a:solidFill>
+            <a:headEnd type="triangle" w="med" len="med"/>
+            <a:tailEnd type="triangle" w="med" len="med"/>
+          </a:ln>
+          <a:effectLst/>
+        </p:spPr>
+        <p:style>
+          <a:lnRef idx="2">
+            <a:schemeClr val="accent1"/>
+          </a:lnRef>
+          <a:fillRef idx="0">
+            <a:schemeClr val="accent1"/>
+          </a:fillRef>
+          <a:effectRef idx="1">
+            <a:schemeClr val="accent1"/>
+          </a:effectRef>
+          <a:fontRef idx="minor">
+            <a:schemeClr val="tx1"/>
+          </a:fontRef>
+        </p:style>
+      </p:cxnSp>
+      <p:cxnSp>
+        <p:nvCxnSpPr>
+          <p:cNvPr id="56" name="Connecteur droit avec flèche 55"/>
+          <p:cNvCxnSpPr/>
+          <p:nvPr/>
+        </p:nvCxnSpPr>
+        <p:spPr>
+          <a:xfrm flipV="1">
+            <a:off x="700196" y="2590269"/>
+            <a:ext cx="781830" cy="1960"/>
+          </a:xfrm>
+          <a:prstGeom prst="straightConnector1">
+            <a:avLst/>
+          </a:prstGeom>
+          <a:ln w="31750">
+            <a:solidFill>
+              <a:srgbClr val="00B050"/>
+            </a:solidFill>
+            <a:headEnd type="triangle" w="med" len="med"/>
+            <a:tailEnd type="triangle" w="med" len="med"/>
+          </a:ln>
+          <a:effectLst/>
+        </p:spPr>
+        <p:style>
+          <a:lnRef idx="2">
+            <a:schemeClr val="accent1"/>
+          </a:lnRef>
+          <a:fillRef idx="0">
+            <a:schemeClr val="accent1"/>
+          </a:fillRef>
+          <a:effectRef idx="1">
+            <a:schemeClr val="accent1"/>
+          </a:effectRef>
+          <a:fontRef idx="minor">
+            <a:schemeClr val="tx1"/>
+          </a:fontRef>
+        </p:style>
+      </p:cxnSp>
+      <p:sp>
+        <p:nvSpPr>
+          <p:cNvPr id="63" name="ZoneTexte 62"/>
+          <p:cNvSpPr txBox="1"/>
+          <p:nvPr/>
+        </p:nvSpPr>
+        <p:spPr>
+          <a:xfrm>
+            <a:off x="689974" y="3385152"/>
+            <a:ext cx="817853" cy="369332"/>
+          </a:xfrm>
+          <a:prstGeom prst="rect">
+            <a:avLst/>
+          </a:prstGeom>
+          <a:noFill/>
+        </p:spPr>
+        <p:txBody>
+          <a:bodyPr wrap="none" rtlCol="0">
+            <a:spAutoFit/>
+          </a:bodyPr>
+          <a:lstStyle/>
+          <a:p>
+            <a:r>
+              <a:rPr lang="fr-FR" dirty="0" err="1" smtClean="0">
+                <a:solidFill>
+                  <a:srgbClr val="00B050"/>
+                </a:solidFill>
+                <a:latin typeface="Consolas" charset="0"/>
+                <a:ea typeface="Consolas" charset="0"/>
+                <a:cs typeface="Consolas" charset="0"/>
+              </a:rPr>
+              <a:t>start</a:t>
+            </a:r>
+            <a:endParaRPr lang="fr-FR" dirty="0">
+              <a:solidFill>
+                <a:srgbClr val="00B050"/>
+              </a:solidFill>
+              <a:latin typeface="Consolas" charset="0"/>
+              <a:ea typeface="Consolas" charset="0"/>
+              <a:cs typeface="Consolas" charset="0"/>
+            </a:endParaRPr>
+          </a:p>
+        </p:txBody>
+      </p:sp>
+      <p:sp>
+        <p:nvSpPr>
+          <p:cNvPr id="70" name="ZoneTexte 69"/>
+          <p:cNvSpPr txBox="1"/>
+          <p:nvPr/>
+        </p:nvSpPr>
+        <p:spPr>
+          <a:xfrm>
+            <a:off x="1934651" y="3369884"/>
+            <a:ext cx="944489" cy="369332"/>
+          </a:xfrm>
+          <a:prstGeom prst="rect">
+            <a:avLst/>
+          </a:prstGeom>
+          <a:noFill/>
+        </p:spPr>
+        <p:txBody>
+          <a:bodyPr wrap="none" rtlCol="0">
+            <a:spAutoFit/>
+          </a:bodyPr>
+          <a:lstStyle/>
+          <a:p>
+            <a:r>
+              <a:rPr lang="fr-FR" dirty="0" err="1" smtClean="0">
+                <a:solidFill>
+                  <a:srgbClr val="0070C0"/>
+                </a:solidFill>
+                <a:latin typeface="Consolas" charset="0"/>
+                <a:ea typeface="Consolas" charset="0"/>
+                <a:cs typeface="Consolas" charset="0"/>
+              </a:rPr>
+              <a:t>period</a:t>
+            </a:r>
+            <a:endParaRPr lang="fr-FR" dirty="0">
+              <a:solidFill>
+                <a:srgbClr val="0070C0"/>
+              </a:solidFill>
+              <a:latin typeface="Consolas" charset="0"/>
+              <a:ea typeface="Consolas" charset="0"/>
+              <a:cs typeface="Consolas" charset="0"/>
+            </a:endParaRPr>
+          </a:p>
+        </p:txBody>
+      </p:sp>
+      <p:cxnSp>
+        <p:nvCxnSpPr>
+          <p:cNvPr id="64" name="Connecteur droit 63"/>
+          <p:cNvCxnSpPr/>
+          <p:nvPr/>
+        </p:nvCxnSpPr>
+        <p:spPr>
+          <a:xfrm>
+            <a:off x="1493274" y="3338416"/>
+            <a:ext cx="0" cy="377143"/>
+          </a:xfrm>
+          <a:prstGeom prst="line">
+            <a:avLst/>
+          </a:prstGeom>
+          <a:ln w="31750">
+            <a:solidFill>
+              <a:srgbClr val="C00000"/>
+            </a:solidFill>
+          </a:ln>
+          <a:effectLst/>
+        </p:spPr>
+        <p:style>
+          <a:lnRef idx="2">
+            <a:schemeClr val="accent1"/>
+          </a:lnRef>
+          <a:fillRef idx="0">
+            <a:schemeClr val="accent1"/>
+          </a:fillRef>
+          <a:effectRef idx="1">
+            <a:schemeClr val="accent1"/>
+          </a:effectRef>
+          <a:fontRef idx="minor">
+            <a:schemeClr val="tx1"/>
+          </a:fontRef>
+        </p:style>
+      </p:cxnSp>
+      <p:cxnSp>
+        <p:nvCxnSpPr>
+          <p:cNvPr id="65" name="Connecteur droit 64"/>
+          <p:cNvCxnSpPr/>
+          <p:nvPr/>
+        </p:nvCxnSpPr>
+        <p:spPr>
+          <a:xfrm>
+            <a:off x="3286978" y="3338416"/>
+            <a:ext cx="0" cy="377143"/>
+          </a:xfrm>
+          <a:prstGeom prst="line">
+            <a:avLst/>
+          </a:prstGeom>
+          <a:ln w="31750">
+            <a:solidFill>
+              <a:srgbClr val="C00000"/>
+            </a:solidFill>
+          </a:ln>
+          <a:effectLst/>
+        </p:spPr>
+        <p:style>
+          <a:lnRef idx="2">
+            <a:schemeClr val="accent1"/>
+          </a:lnRef>
+          <a:fillRef idx="0">
+            <a:schemeClr val="accent1"/>
+          </a:fillRef>
+          <a:effectRef idx="1">
+            <a:schemeClr val="accent1"/>
+          </a:effectRef>
+          <a:fontRef idx="minor">
+            <a:schemeClr val="tx1"/>
+          </a:fontRef>
+        </p:style>
+      </p:cxnSp>
+      <p:cxnSp>
+        <p:nvCxnSpPr>
+          <p:cNvPr id="66" name="Connecteur droit 65"/>
+          <p:cNvCxnSpPr/>
+          <p:nvPr/>
+        </p:nvCxnSpPr>
+        <p:spPr>
+          <a:xfrm>
+            <a:off x="5088754" y="3338416"/>
+            <a:ext cx="0" cy="377143"/>
+          </a:xfrm>
+          <a:prstGeom prst="line">
+            <a:avLst/>
+          </a:prstGeom>
+          <a:ln w="31750">
+            <a:solidFill>
+              <a:srgbClr val="C00000"/>
+            </a:solidFill>
+          </a:ln>
+          <a:effectLst/>
+        </p:spPr>
+        <p:style>
+          <a:lnRef idx="2">
+            <a:schemeClr val="accent1"/>
+          </a:lnRef>
+          <a:fillRef idx="0">
+            <a:schemeClr val="accent1"/>
+          </a:fillRef>
+          <a:effectRef idx="1">
+            <a:schemeClr val="accent1"/>
+          </a:effectRef>
+          <a:fontRef idx="minor">
+            <a:schemeClr val="tx1"/>
+          </a:fontRef>
+        </p:style>
+      </p:cxnSp>
+      <p:cxnSp>
+        <p:nvCxnSpPr>
+          <p:cNvPr id="67" name="Connecteur droit 66"/>
+          <p:cNvCxnSpPr/>
+          <p:nvPr/>
+        </p:nvCxnSpPr>
+        <p:spPr>
+          <a:xfrm>
+            <a:off x="6882458" y="3338416"/>
+            <a:ext cx="0" cy="377143"/>
+          </a:xfrm>
+          <a:prstGeom prst="line">
+            <a:avLst/>
+          </a:prstGeom>
+          <a:ln w="31750">
+            <a:solidFill>
+              <a:srgbClr val="C00000"/>
+            </a:solidFill>
+          </a:ln>
+          <a:effectLst/>
+        </p:spPr>
+        <p:style>
+          <a:lnRef idx="2">
+            <a:schemeClr val="accent1"/>
+          </a:lnRef>
+          <a:fillRef idx="0">
+            <a:schemeClr val="accent1"/>
+          </a:fillRef>
+          <a:effectRef idx="1">
+            <a:schemeClr val="accent1"/>
+          </a:effectRef>
+          <a:fontRef idx="minor">
+            <a:schemeClr val="tx1"/>
+          </a:fontRef>
+        </p:style>
+      </p:cxnSp>
+      <p:cxnSp>
+        <p:nvCxnSpPr>
+          <p:cNvPr id="69" name="Connecteur droit avec flèche 68"/>
+          <p:cNvCxnSpPr/>
+          <p:nvPr/>
+        </p:nvCxnSpPr>
+        <p:spPr>
+          <a:xfrm>
+            <a:off x="1493274" y="3424191"/>
+            <a:ext cx="1793704" cy="0"/>
+          </a:xfrm>
+          <a:prstGeom prst="straightConnector1">
+            <a:avLst/>
+          </a:prstGeom>
+          <a:ln w="31750">
+            <a:solidFill>
+              <a:srgbClr val="0070C0"/>
+            </a:solidFill>
+            <a:headEnd type="triangle" w="med" len="med"/>
+            <a:tailEnd type="triangle" w="med" len="med"/>
+          </a:ln>
+          <a:effectLst/>
+        </p:spPr>
+        <p:style>
+          <a:lnRef idx="2">
+            <a:schemeClr val="accent1"/>
+          </a:lnRef>
+          <a:fillRef idx="0">
+            <a:schemeClr val="accent1"/>
+          </a:fillRef>
+          <a:effectRef idx="1">
+            <a:schemeClr val="accent1"/>
+          </a:effectRef>
+          <a:fontRef idx="minor">
+            <a:schemeClr val="tx1"/>
+          </a:fontRef>
+        </p:style>
+      </p:cxnSp>
+      <p:cxnSp>
+        <p:nvCxnSpPr>
+          <p:cNvPr id="71" name="Connecteur droit avec flèche 70"/>
+          <p:cNvCxnSpPr/>
+          <p:nvPr/>
+        </p:nvCxnSpPr>
+        <p:spPr>
+          <a:xfrm flipV="1">
+            <a:off x="700196" y="3422231"/>
+            <a:ext cx="781830" cy="1960"/>
+          </a:xfrm>
+          <a:prstGeom prst="straightConnector1">
+            <a:avLst/>
+          </a:prstGeom>
+          <a:ln w="31750">
+            <a:solidFill>
+              <a:srgbClr val="00B050"/>
+            </a:solidFill>
+            <a:headEnd type="triangle" w="med" len="med"/>
+            <a:tailEnd type="triangle" w="med" len="med"/>
+          </a:ln>
+          <a:effectLst/>
+        </p:spPr>
+        <p:style>
+          <a:lnRef idx="2">
+            <a:schemeClr val="accent1"/>
+          </a:lnRef>
+          <a:fillRef idx="0">
+            <a:schemeClr val="accent1"/>
+          </a:fillRef>
+          <a:effectRef idx="1">
+            <a:schemeClr val="accent1"/>
+          </a:effectRef>
+          <a:fontRef idx="minor">
+            <a:schemeClr val="tx1"/>
+          </a:fontRef>
+        </p:style>
+      </p:cxnSp>
+      <p:cxnSp>
+        <p:nvCxnSpPr>
+          <p:cNvPr id="72" name="Connecteur droit avec flèche 71"/>
+          <p:cNvCxnSpPr/>
+          <p:nvPr/>
+        </p:nvCxnSpPr>
+        <p:spPr>
+          <a:xfrm>
+            <a:off x="700196" y="3283466"/>
+            <a:ext cx="6583382" cy="0"/>
+          </a:xfrm>
+          <a:prstGeom prst="straightConnector1">
+            <a:avLst/>
+          </a:prstGeom>
+          <a:ln w="31750">
+            <a:solidFill>
+              <a:srgbClr val="FF6E00"/>
+            </a:solidFill>
+            <a:headEnd type="triangle" w="med" len="med"/>
+            <a:tailEnd type="triangle" w="med" len="med"/>
+          </a:ln>
+          <a:effectLst/>
+        </p:spPr>
+        <p:style>
+          <a:lnRef idx="2">
+            <a:schemeClr val="accent1"/>
+          </a:lnRef>
+          <a:fillRef idx="0">
+            <a:schemeClr val="accent1"/>
+          </a:fillRef>
+          <a:effectRef idx="1">
+            <a:schemeClr val="accent1"/>
+          </a:effectRef>
+          <a:fontRef idx="minor">
+            <a:schemeClr val="tx1"/>
+          </a:fontRef>
+        </p:style>
+      </p:cxnSp>
+      <p:sp>
+        <p:nvSpPr>
+          <p:cNvPr id="75" name="ZoneTexte 74"/>
+          <p:cNvSpPr txBox="1"/>
+          <p:nvPr/>
+        </p:nvSpPr>
+        <p:spPr>
+          <a:xfrm>
+            <a:off x="3854809" y="3236669"/>
+            <a:ext cx="564578" cy="369332"/>
+          </a:xfrm>
+          <a:prstGeom prst="rect">
+            <a:avLst/>
+          </a:prstGeom>
+          <a:noFill/>
+        </p:spPr>
+        <p:txBody>
+          <a:bodyPr wrap="none" rtlCol="0">
+            <a:spAutoFit/>
+          </a:bodyPr>
+          <a:lstStyle/>
+          <a:p>
+            <a:r>
+              <a:rPr lang="fr-FR" dirty="0" smtClean="0">
+                <a:solidFill>
+                  <a:srgbClr val="FF6E00"/>
+                </a:solidFill>
+                <a:latin typeface="Consolas" charset="0"/>
+                <a:ea typeface="Consolas" charset="0"/>
+                <a:cs typeface="Consolas" charset="0"/>
+              </a:rPr>
+              <a:t>end</a:t>
+            </a:r>
+            <a:endParaRPr lang="fr-FR" dirty="0">
+              <a:solidFill>
+                <a:srgbClr val="FF6E00"/>
+              </a:solidFill>
+              <a:latin typeface="Consolas" charset="0"/>
+              <a:ea typeface="Consolas" charset="0"/>
+              <a:cs typeface="Consolas" charset="0"/>
+            </a:endParaRPr>
+          </a:p>
+        </p:txBody>
+      </p:sp>
+      <p:sp>
+        <p:nvSpPr>
+          <p:cNvPr id="76" name="ZoneTexte 75"/>
+          <p:cNvSpPr txBox="1"/>
+          <p:nvPr/>
+        </p:nvSpPr>
+        <p:spPr>
+          <a:xfrm>
+            <a:off x="689974" y="4190982"/>
+            <a:ext cx="817853" cy="369332"/>
+          </a:xfrm>
+          <a:prstGeom prst="rect">
+            <a:avLst/>
+          </a:prstGeom>
+          <a:noFill/>
+        </p:spPr>
+        <p:txBody>
+          <a:bodyPr wrap="none" rtlCol="0">
+            <a:spAutoFit/>
+          </a:bodyPr>
+          <a:lstStyle/>
+          <a:p>
+            <a:r>
+              <a:rPr lang="fr-FR" dirty="0" err="1" smtClean="0">
+                <a:solidFill>
+                  <a:srgbClr val="00B050"/>
+                </a:solidFill>
+                <a:latin typeface="Consolas" charset="0"/>
+                <a:ea typeface="Consolas" charset="0"/>
+                <a:cs typeface="Consolas" charset="0"/>
+              </a:rPr>
+              <a:t>start</a:t>
+            </a:r>
+            <a:endParaRPr lang="fr-FR" dirty="0">
+              <a:solidFill>
+                <a:srgbClr val="00B050"/>
+              </a:solidFill>
+              <a:latin typeface="Consolas" charset="0"/>
+              <a:ea typeface="Consolas" charset="0"/>
+              <a:cs typeface="Consolas" charset="0"/>
+            </a:endParaRPr>
+          </a:p>
+        </p:txBody>
+      </p:sp>
+      <p:cxnSp>
+        <p:nvCxnSpPr>
+          <p:cNvPr id="77" name="Connecteur droit 76"/>
+          <p:cNvCxnSpPr/>
+          <p:nvPr/>
+        </p:nvCxnSpPr>
+        <p:spPr>
+          <a:xfrm>
+            <a:off x="1493274" y="4144246"/>
+            <a:ext cx="0" cy="377143"/>
+          </a:xfrm>
+          <a:prstGeom prst="line">
+            <a:avLst/>
+          </a:prstGeom>
+          <a:ln w="31750">
+            <a:solidFill>
+              <a:srgbClr val="C00000"/>
+            </a:solidFill>
+          </a:ln>
+          <a:effectLst/>
+        </p:spPr>
+        <p:style>
+          <a:lnRef idx="2">
+            <a:schemeClr val="accent1"/>
+          </a:lnRef>
+          <a:fillRef idx="0">
+            <a:schemeClr val="accent1"/>
+          </a:fillRef>
+          <a:effectRef idx="1">
+            <a:schemeClr val="accent1"/>
+          </a:effectRef>
+          <a:fontRef idx="minor">
+            <a:schemeClr val="tx1"/>
+          </a:fontRef>
+        </p:style>
+      </p:cxnSp>
+      <p:cxnSp>
+        <p:nvCxnSpPr>
+          <p:cNvPr id="78" name="Connecteur droit 77"/>
+          <p:cNvCxnSpPr/>
+          <p:nvPr/>
+        </p:nvCxnSpPr>
+        <p:spPr>
+          <a:xfrm>
+            <a:off x="3286978" y="4144246"/>
+            <a:ext cx="0" cy="377143"/>
+          </a:xfrm>
+          <a:prstGeom prst="line">
+            <a:avLst/>
+          </a:prstGeom>
+          <a:ln w="31750">
+            <a:solidFill>
+              <a:srgbClr val="C00000"/>
+            </a:solidFill>
+          </a:ln>
+          <a:effectLst/>
+        </p:spPr>
+        <p:style>
+          <a:lnRef idx="2">
+            <a:schemeClr val="accent1"/>
+          </a:lnRef>
+          <a:fillRef idx="0">
+            <a:schemeClr val="accent1"/>
+          </a:fillRef>
+          <a:effectRef idx="1">
+            <a:schemeClr val="accent1"/>
+          </a:effectRef>
+          <a:fontRef idx="minor">
+            <a:schemeClr val="tx1"/>
+          </a:fontRef>
+        </p:style>
+      </p:cxnSp>
+      <p:cxnSp>
+        <p:nvCxnSpPr>
+          <p:cNvPr id="79" name="Connecteur droit 78"/>
+          <p:cNvCxnSpPr/>
+          <p:nvPr/>
+        </p:nvCxnSpPr>
+        <p:spPr>
+          <a:xfrm>
+            <a:off x="5088754" y="4144246"/>
+            <a:ext cx="0" cy="377143"/>
+          </a:xfrm>
+          <a:prstGeom prst="line">
+            <a:avLst/>
+          </a:prstGeom>
+          <a:ln w="31750">
+            <a:solidFill>
+              <a:srgbClr val="C00000"/>
+            </a:solidFill>
+          </a:ln>
+          <a:effectLst/>
+        </p:spPr>
+        <p:style>
+          <a:lnRef idx="2">
+            <a:schemeClr val="accent1"/>
+          </a:lnRef>
+          <a:fillRef idx="0">
+            <a:schemeClr val="accent1"/>
+          </a:fillRef>
+          <a:effectRef idx="1">
+            <a:schemeClr val="accent1"/>
+          </a:effectRef>
+          <a:fontRef idx="minor">
+            <a:schemeClr val="tx1"/>
+          </a:fontRef>
+        </p:style>
+      </p:cxnSp>
+      <p:cxnSp>
+        <p:nvCxnSpPr>
+          <p:cNvPr id="80" name="Connecteur droit 79"/>
+          <p:cNvCxnSpPr/>
+          <p:nvPr/>
+        </p:nvCxnSpPr>
+        <p:spPr>
+          <a:xfrm>
+            <a:off x="6882458" y="4144246"/>
+            <a:ext cx="0" cy="377143"/>
+          </a:xfrm>
+          <a:prstGeom prst="line">
+            <a:avLst/>
+          </a:prstGeom>
+          <a:ln w="31750">
+            <a:solidFill>
+              <a:srgbClr val="C00000"/>
+            </a:solidFill>
+          </a:ln>
+          <a:effectLst/>
+        </p:spPr>
+        <p:style>
+          <a:lnRef idx="2">
+            <a:schemeClr val="accent1"/>
+          </a:lnRef>
+          <a:fillRef idx="0">
+            <a:schemeClr val="accent1"/>
+          </a:fillRef>
+          <a:effectRef idx="1">
+            <a:schemeClr val="accent1"/>
+          </a:effectRef>
+          <a:fontRef idx="minor">
+            <a:schemeClr val="tx1"/>
+          </a:fontRef>
+        </p:style>
+      </p:cxnSp>
+      <p:sp>
+        <p:nvSpPr>
+          <p:cNvPr id="82" name="ZoneTexte 81"/>
+          <p:cNvSpPr txBox="1"/>
+          <p:nvPr/>
+        </p:nvSpPr>
+        <p:spPr>
+          <a:xfrm>
+            <a:off x="1934651" y="4041911"/>
+            <a:ext cx="944489" cy="369332"/>
+          </a:xfrm>
+          <a:prstGeom prst="rect">
+            <a:avLst/>
+          </a:prstGeom>
+          <a:noFill/>
+        </p:spPr>
+        <p:txBody>
+          <a:bodyPr wrap="none" rtlCol="0">
+            <a:spAutoFit/>
+          </a:bodyPr>
+          <a:lstStyle/>
+          <a:p>
+            <a:r>
+              <a:rPr lang="fr-FR" dirty="0" err="1" smtClean="0">
+                <a:solidFill>
+                  <a:srgbClr val="0070C0"/>
+                </a:solidFill>
+                <a:latin typeface="Consolas" charset="0"/>
+                <a:ea typeface="Consolas" charset="0"/>
+                <a:cs typeface="Consolas" charset="0"/>
+              </a:rPr>
+              <a:t>period</a:t>
+            </a:r>
+            <a:endParaRPr lang="fr-FR" dirty="0">
+              <a:solidFill>
+                <a:srgbClr val="0070C0"/>
+              </a:solidFill>
+              <a:latin typeface="Consolas" charset="0"/>
+              <a:ea typeface="Consolas" charset="0"/>
+              <a:cs typeface="Consolas" charset="0"/>
+            </a:endParaRPr>
+          </a:p>
+        </p:txBody>
+      </p:sp>
+      <p:cxnSp>
+        <p:nvCxnSpPr>
+          <p:cNvPr id="83" name="Connecteur droit avec flèche 82"/>
+          <p:cNvCxnSpPr/>
+          <p:nvPr/>
+        </p:nvCxnSpPr>
+        <p:spPr>
+          <a:xfrm flipV="1">
+            <a:off x="700196" y="4228061"/>
+            <a:ext cx="781830" cy="1960"/>
+          </a:xfrm>
+          <a:prstGeom prst="straightConnector1">
+            <a:avLst/>
+          </a:prstGeom>
+          <a:ln w="31750">
+            <a:solidFill>
+              <a:srgbClr val="00B050"/>
+            </a:solidFill>
+            <a:headEnd type="triangle" w="med" len="med"/>
+            <a:tailEnd type="triangle" w="med" len="med"/>
+          </a:ln>
+          <a:effectLst/>
+        </p:spPr>
+        <p:style>
+          <a:lnRef idx="2">
+            <a:schemeClr val="accent1"/>
+          </a:lnRef>
+          <a:fillRef idx="0">
+            <a:schemeClr val="accent1"/>
+          </a:fillRef>
+          <a:effectRef idx="1">
+            <a:schemeClr val="accent1"/>
+          </a:effectRef>
+          <a:fontRef idx="minor">
+            <a:schemeClr val="tx1"/>
+          </a:fontRef>
+        </p:style>
+      </p:cxnSp>
+      <p:cxnSp>
+        <p:nvCxnSpPr>
+          <p:cNvPr id="84" name="Connecteur droit avec flèche 83"/>
+          <p:cNvCxnSpPr/>
+          <p:nvPr/>
+        </p:nvCxnSpPr>
+        <p:spPr>
+          <a:xfrm>
+            <a:off x="700196" y="4018176"/>
+            <a:ext cx="6583382" cy="0"/>
+          </a:xfrm>
+          <a:prstGeom prst="straightConnector1">
+            <a:avLst/>
+          </a:prstGeom>
+          <a:ln w="31750">
+            <a:solidFill>
+              <a:srgbClr val="FF6E00"/>
+            </a:solidFill>
+            <a:headEnd type="stealth"/>
+            <a:tailEnd type="stealth"/>
+          </a:ln>
+          <a:effectLst/>
+        </p:spPr>
+        <p:style>
+          <a:lnRef idx="2">
+            <a:schemeClr val="accent1"/>
+          </a:lnRef>
+          <a:fillRef idx="0">
+            <a:schemeClr val="accent1"/>
+          </a:fillRef>
+          <a:effectRef idx="1">
+            <a:schemeClr val="accent1"/>
+          </a:effectRef>
+          <a:fontRef idx="minor">
+            <a:schemeClr val="tx1"/>
+          </a:fontRef>
+        </p:style>
+      </p:cxnSp>
+      <p:sp>
+        <p:nvSpPr>
+          <p:cNvPr id="85" name="ZoneTexte 84"/>
+          <p:cNvSpPr txBox="1"/>
+          <p:nvPr/>
+        </p:nvSpPr>
+        <p:spPr>
+          <a:xfrm>
+            <a:off x="3854809" y="3971379"/>
+            <a:ext cx="564578" cy="369332"/>
+          </a:xfrm>
+          <a:prstGeom prst="rect">
+            <a:avLst/>
+          </a:prstGeom>
+          <a:noFill/>
+        </p:spPr>
+        <p:txBody>
+          <a:bodyPr wrap="none" rtlCol="0">
+            <a:spAutoFit/>
+          </a:bodyPr>
+          <a:lstStyle/>
+          <a:p>
+            <a:r>
+              <a:rPr lang="fr-FR" smtClean="0">
+                <a:solidFill>
+                  <a:srgbClr val="FF6E00"/>
+                </a:solidFill>
+                <a:latin typeface="Consolas" charset="0"/>
+                <a:ea typeface="Consolas" charset="0"/>
+                <a:cs typeface="Consolas" charset="0"/>
+              </a:rPr>
+              <a:t>end</a:t>
+            </a:r>
+            <a:endParaRPr lang="fr-FR" dirty="0">
+              <a:solidFill>
+                <a:srgbClr val="FF6E00"/>
+              </a:solidFill>
+              <a:latin typeface="Consolas" charset="0"/>
+              <a:ea typeface="Consolas" charset="0"/>
+              <a:cs typeface="Consolas" charset="0"/>
+            </a:endParaRPr>
+          </a:p>
+        </p:txBody>
+      </p:sp>
+      <p:cxnSp>
+        <p:nvCxnSpPr>
+          <p:cNvPr id="86" name="Connecteur droit 85"/>
+          <p:cNvCxnSpPr/>
+          <p:nvPr/>
+        </p:nvCxnSpPr>
+        <p:spPr>
+          <a:xfrm>
+            <a:off x="1555994" y="4144246"/>
+            <a:ext cx="0" cy="377143"/>
+          </a:xfrm>
+          <a:prstGeom prst="line">
+            <a:avLst/>
+          </a:prstGeom>
+          <a:ln w="31750">
+            <a:solidFill>
+              <a:srgbClr val="C00000"/>
+            </a:solidFill>
+          </a:ln>
+          <a:effectLst/>
+        </p:spPr>
+        <p:style>
+          <a:lnRef idx="2">
+            <a:schemeClr val="accent1"/>
+          </a:lnRef>
+          <a:fillRef idx="0">
+            <a:schemeClr val="accent1"/>
+          </a:fillRef>
+          <a:effectRef idx="1">
+            <a:schemeClr val="accent1"/>
+          </a:effectRef>
+          <a:fontRef idx="minor">
+            <a:schemeClr val="tx1"/>
+          </a:fontRef>
+        </p:style>
+      </p:cxnSp>
+      <p:cxnSp>
+        <p:nvCxnSpPr>
+          <p:cNvPr id="87" name="Connecteur droit 86"/>
+          <p:cNvCxnSpPr/>
+          <p:nvPr/>
+        </p:nvCxnSpPr>
+        <p:spPr>
+          <a:xfrm>
+            <a:off x="1622524" y="4144246"/>
+            <a:ext cx="0" cy="377143"/>
+          </a:xfrm>
+          <a:prstGeom prst="line">
+            <a:avLst/>
+          </a:prstGeom>
+          <a:ln w="31750">
+            <a:solidFill>
+              <a:srgbClr val="C00000"/>
+            </a:solidFill>
+          </a:ln>
+          <a:effectLst/>
+        </p:spPr>
+        <p:style>
+          <a:lnRef idx="2">
+            <a:schemeClr val="accent1"/>
+          </a:lnRef>
+          <a:fillRef idx="0">
+            <a:schemeClr val="accent1"/>
+          </a:fillRef>
+          <a:effectRef idx="1">
+            <a:schemeClr val="accent1"/>
+          </a:effectRef>
+          <a:fontRef idx="minor">
+            <a:schemeClr val="tx1"/>
+          </a:fontRef>
+        </p:style>
+      </p:cxnSp>
+      <p:cxnSp>
+        <p:nvCxnSpPr>
+          <p:cNvPr id="88" name="Connecteur droit 87"/>
+          <p:cNvCxnSpPr/>
+          <p:nvPr/>
+        </p:nvCxnSpPr>
+        <p:spPr>
+          <a:xfrm>
+            <a:off x="3349771" y="4144246"/>
+            <a:ext cx="0" cy="377143"/>
+          </a:xfrm>
+          <a:prstGeom prst="line">
+            <a:avLst/>
+          </a:prstGeom>
+          <a:ln w="31750">
+            <a:solidFill>
+              <a:srgbClr val="C00000"/>
+            </a:solidFill>
+          </a:ln>
+          <a:effectLst/>
+        </p:spPr>
+        <p:style>
+          <a:lnRef idx="2">
+            <a:schemeClr val="accent1"/>
+          </a:lnRef>
+          <a:fillRef idx="0">
+            <a:schemeClr val="accent1"/>
+          </a:fillRef>
+          <a:effectRef idx="1">
+            <a:schemeClr val="accent1"/>
+          </a:effectRef>
+          <a:fontRef idx="minor">
+            <a:schemeClr val="tx1"/>
+          </a:fontRef>
+        </p:style>
+      </p:cxnSp>
+      <p:cxnSp>
+        <p:nvCxnSpPr>
+          <p:cNvPr id="89" name="Connecteur droit 88"/>
+          <p:cNvCxnSpPr/>
+          <p:nvPr/>
+        </p:nvCxnSpPr>
+        <p:spPr>
+          <a:xfrm>
+            <a:off x="3416301" y="4144246"/>
+            <a:ext cx="0" cy="377143"/>
+          </a:xfrm>
+          <a:prstGeom prst="line">
+            <a:avLst/>
+          </a:prstGeom>
+          <a:ln w="31750">
+            <a:solidFill>
+              <a:srgbClr val="C00000"/>
+            </a:solidFill>
+          </a:ln>
+          <a:effectLst/>
+        </p:spPr>
+        <p:style>
+          <a:lnRef idx="2">
+            <a:schemeClr val="accent1"/>
+          </a:lnRef>
+          <a:fillRef idx="0">
+            <a:schemeClr val="accent1"/>
+          </a:fillRef>
+          <a:effectRef idx="1">
+            <a:schemeClr val="accent1"/>
+          </a:effectRef>
+          <a:fontRef idx="minor">
+            <a:schemeClr val="tx1"/>
+          </a:fontRef>
+        </p:style>
+      </p:cxnSp>
+      <p:cxnSp>
+        <p:nvCxnSpPr>
+          <p:cNvPr id="90" name="Connecteur droit 89"/>
+          <p:cNvCxnSpPr/>
+          <p:nvPr/>
+        </p:nvCxnSpPr>
+        <p:spPr>
+          <a:xfrm>
+            <a:off x="5154763" y="4144246"/>
+            <a:ext cx="0" cy="377143"/>
+          </a:xfrm>
+          <a:prstGeom prst="line">
+            <a:avLst/>
+          </a:prstGeom>
+          <a:ln w="31750">
+            <a:solidFill>
+              <a:srgbClr val="C00000"/>
+            </a:solidFill>
+          </a:ln>
+          <a:effectLst/>
+        </p:spPr>
+        <p:style>
+          <a:lnRef idx="2">
+            <a:schemeClr val="accent1"/>
+          </a:lnRef>
+          <a:fillRef idx="0">
+            <a:schemeClr val="accent1"/>
+          </a:fillRef>
+          <a:effectRef idx="1">
+            <a:schemeClr val="accent1"/>
+          </a:effectRef>
+          <a:fontRef idx="minor">
+            <a:schemeClr val="tx1"/>
+          </a:fontRef>
+        </p:style>
+      </p:cxnSp>
+      <p:cxnSp>
+        <p:nvCxnSpPr>
+          <p:cNvPr id="91" name="Connecteur droit 90"/>
+          <p:cNvCxnSpPr/>
+          <p:nvPr/>
+        </p:nvCxnSpPr>
+        <p:spPr>
+          <a:xfrm>
+            <a:off x="5221293" y="4144246"/>
+            <a:ext cx="0" cy="377143"/>
+          </a:xfrm>
+          <a:prstGeom prst="line">
+            <a:avLst/>
+          </a:prstGeom>
+          <a:ln w="31750">
+            <a:solidFill>
+              <a:srgbClr val="C00000"/>
+            </a:solidFill>
+          </a:ln>
+          <a:effectLst/>
+        </p:spPr>
+        <p:style>
+          <a:lnRef idx="2">
+            <a:schemeClr val="accent1"/>
+          </a:lnRef>
+          <a:fillRef idx="0">
+            <a:schemeClr val="accent1"/>
+          </a:fillRef>
+          <a:effectRef idx="1">
+            <a:schemeClr val="accent1"/>
+          </a:effectRef>
+          <a:fontRef idx="minor">
+            <a:schemeClr val="tx1"/>
+          </a:fontRef>
+        </p:style>
+      </p:cxnSp>
+      <p:cxnSp>
+        <p:nvCxnSpPr>
+          <p:cNvPr id="92" name="Connecteur droit 91"/>
+          <p:cNvCxnSpPr/>
+          <p:nvPr/>
+        </p:nvCxnSpPr>
+        <p:spPr>
+          <a:xfrm>
+            <a:off x="6943597" y="4143847"/>
+            <a:ext cx="0" cy="377143"/>
+          </a:xfrm>
+          <a:prstGeom prst="line">
+            <a:avLst/>
+          </a:prstGeom>
+          <a:ln w="31750">
+            <a:solidFill>
+              <a:srgbClr val="C00000"/>
+            </a:solidFill>
+          </a:ln>
+          <a:effectLst/>
+        </p:spPr>
+        <p:style>
+          <a:lnRef idx="2">
+            <a:schemeClr val="accent1"/>
+          </a:lnRef>
+          <a:fillRef idx="0">
+            <a:schemeClr val="accent1"/>
+          </a:fillRef>
+          <a:effectRef idx="1">
+            <a:schemeClr val="accent1"/>
+          </a:effectRef>
+          <a:fontRef idx="minor">
+            <a:schemeClr val="tx1"/>
+          </a:fontRef>
+        </p:style>
+      </p:cxnSp>
+      <p:cxnSp>
+        <p:nvCxnSpPr>
+          <p:cNvPr id="93" name="Connecteur droit 92"/>
+          <p:cNvCxnSpPr/>
+          <p:nvPr/>
+        </p:nvCxnSpPr>
+        <p:spPr>
+          <a:xfrm>
+            <a:off x="7010127" y="4143847"/>
+            <a:ext cx="0" cy="377143"/>
+          </a:xfrm>
+          <a:prstGeom prst="line">
+            <a:avLst/>
+          </a:prstGeom>
+          <a:ln w="31750">
+            <a:solidFill>
+              <a:srgbClr val="C00000"/>
+            </a:solidFill>
+          </a:ln>
+          <a:effectLst/>
+        </p:spPr>
+        <p:style>
+          <a:lnRef idx="2">
+            <a:schemeClr val="accent1"/>
+          </a:lnRef>
+          <a:fillRef idx="0">
+            <a:schemeClr val="accent1"/>
+          </a:fillRef>
+          <a:effectRef idx="1">
+            <a:schemeClr val="accent1"/>
+          </a:effectRef>
+          <a:fontRef idx="minor">
+            <a:schemeClr val="tx1"/>
+          </a:fontRef>
+        </p:style>
+      </p:cxnSp>
+      <p:sp>
+        <p:nvSpPr>
+          <p:cNvPr id="95" name="Parenthèse ouvrante 94"/>
+          <p:cNvSpPr/>
+          <p:nvPr/>
+        </p:nvSpPr>
+        <p:spPr>
+          <a:xfrm rot="16200000">
+            <a:off x="5106606" y="4421693"/>
+            <a:ext cx="90314" cy="274670"/>
+          </a:xfrm>
+          <a:prstGeom prst="leftBracket">
+            <a:avLst>
+              <a:gd name="adj" fmla="val 64644"/>
+            </a:avLst>
+          </a:prstGeom>
+          <a:ln w="31750">
+            <a:solidFill>
+              <a:srgbClr val="7224B2"/>
+            </a:solidFill>
+          </a:ln>
+          <a:effectLst/>
+        </p:spPr>
+        <p:style>
+          <a:lnRef idx="2">
+            <a:schemeClr val="accent1"/>
+          </a:lnRef>
+          <a:fillRef idx="0">
+            <a:schemeClr val="accent1"/>
+          </a:fillRef>
+          <a:effectRef idx="1">
+            <a:schemeClr val="accent1"/>
+          </a:effectRef>
+          <a:fontRef idx="minor">
+            <a:schemeClr val="tx1"/>
+          </a:fontRef>
+        </p:style>
+        <p:txBody>
+          <a:bodyPr rtlCol="0" anchor="ctr"/>
+          <a:lstStyle/>
+          <a:p>
+            <a:pPr algn="ctr"/>
+            <a:endParaRPr lang="fr-FR" sz="3200"/>
+          </a:p>
+        </p:txBody>
+      </p:sp>
+      <p:sp>
+        <p:nvSpPr>
+          <p:cNvPr id="98" name="ZoneTexte 97"/>
+          <p:cNvSpPr txBox="1"/>
+          <p:nvPr/>
+        </p:nvSpPr>
+        <p:spPr>
+          <a:xfrm>
+            <a:off x="5526578" y="3994595"/>
+            <a:ext cx="944489" cy="646331"/>
+          </a:xfrm>
+          <a:prstGeom prst="rect">
+            <a:avLst/>
+          </a:prstGeom>
+          <a:noFill/>
+        </p:spPr>
+        <p:txBody>
+          <a:bodyPr wrap="none" rtlCol="0">
+            <a:spAutoFit/>
+          </a:bodyPr>
+          <a:lstStyle/>
+          <a:p>
+            <a:r>
+              <a:rPr lang="fr-FR" dirty="0" err="1" smtClean="0">
+                <a:solidFill>
+                  <a:srgbClr val="7224B2"/>
+                </a:solidFill>
+                <a:latin typeface="Consolas" charset="0"/>
+                <a:ea typeface="Consolas" charset="0"/>
+                <a:cs typeface="Consolas" charset="0"/>
+              </a:rPr>
+              <a:t>repeat</a:t>
+            </a:r>
+            <a:endParaRPr lang="fr-FR" dirty="0">
+              <a:solidFill>
+                <a:srgbClr val="7224B2"/>
+              </a:solidFill>
+              <a:latin typeface="Consolas" charset="0"/>
+              <a:ea typeface="Consolas" charset="0"/>
+              <a:cs typeface="Consolas" charset="0"/>
+            </a:endParaRPr>
+          </a:p>
+          <a:p>
+            <a:r>
+              <a:rPr lang="fr-FR" dirty="0" smtClean="0">
+                <a:solidFill>
+                  <a:srgbClr val="7224B2"/>
+                </a:solidFill>
+                <a:latin typeface="Consolas" charset="0"/>
+                <a:ea typeface="Consolas" charset="0"/>
+                <a:cs typeface="Consolas" charset="0"/>
+              </a:rPr>
+              <a:t>(=3)</a:t>
+            </a:r>
+            <a:endParaRPr lang="fr-FR" dirty="0">
+              <a:solidFill>
+                <a:srgbClr val="7224B2"/>
+              </a:solidFill>
+              <a:latin typeface="Consolas" charset="0"/>
+              <a:ea typeface="Consolas" charset="0"/>
+              <a:cs typeface="Consolas" charset="0"/>
+            </a:endParaRPr>
+          </a:p>
+        </p:txBody>
+      </p:sp>
+      <p:cxnSp>
+        <p:nvCxnSpPr>
+          <p:cNvPr id="97" name="Connecteur droit avec flèche 96"/>
+          <p:cNvCxnSpPr/>
+          <p:nvPr/>
+        </p:nvCxnSpPr>
+        <p:spPr>
+          <a:xfrm flipV="1">
+            <a:off x="5314187" y="4386788"/>
+            <a:ext cx="276491" cy="164718"/>
+          </a:xfrm>
+          <a:prstGeom prst="straightConnector1">
+            <a:avLst/>
+          </a:prstGeom>
+          <a:ln w="31750">
+            <a:solidFill>
+              <a:srgbClr val="7224B2"/>
+            </a:solidFill>
+            <a:tailEnd type="triangle" w="med" len="med"/>
+          </a:ln>
+          <a:effectLst/>
+        </p:spPr>
+        <p:style>
+          <a:lnRef idx="2">
+            <a:schemeClr val="accent1"/>
+          </a:lnRef>
+          <a:fillRef idx="0">
+            <a:schemeClr val="accent1"/>
+          </a:fillRef>
+          <a:effectRef idx="1">
+            <a:schemeClr val="accent1"/>
+          </a:effectRef>
+          <a:fontRef idx="minor">
+            <a:schemeClr val="tx1"/>
+          </a:fontRef>
+        </p:style>
+      </p:cxnSp>
+      <p:cxnSp>
+        <p:nvCxnSpPr>
+          <p:cNvPr id="81" name="Connecteur droit avec flèche 80"/>
+          <p:cNvCxnSpPr/>
+          <p:nvPr/>
+        </p:nvCxnSpPr>
+        <p:spPr>
+          <a:xfrm>
+            <a:off x="1493274" y="4096218"/>
+            <a:ext cx="1793704" cy="0"/>
+          </a:xfrm>
+          <a:prstGeom prst="straightConnector1">
+            <a:avLst/>
+          </a:prstGeom>
+          <a:ln w="28575">
+            <a:solidFill>
+              <a:srgbClr val="0070C0"/>
+            </a:solidFill>
+            <a:headEnd type="triangle" w="med" len="med"/>
+            <a:tailEnd type="triangle" w="med" len="med"/>
+          </a:ln>
+          <a:effectLst/>
+        </p:spPr>
+        <p:style>
+          <a:lnRef idx="2">
+            <a:schemeClr val="accent1"/>
+          </a:lnRef>
+          <a:fillRef idx="0">
+            <a:schemeClr val="accent1"/>
+          </a:fillRef>
+          <a:effectRef idx="1">
+            <a:schemeClr val="accent1"/>
+          </a:effectRef>
+          <a:fontRef idx="minor">
+            <a:schemeClr val="tx1"/>
+          </a:fontRef>
+        </p:style>
+      </p:cxnSp>
+      <p:sp>
+        <p:nvSpPr>
+          <p:cNvPr id="133" name="ZoneTexte 132"/>
+          <p:cNvSpPr txBox="1"/>
+          <p:nvPr/>
+        </p:nvSpPr>
+        <p:spPr>
+          <a:xfrm>
+            <a:off x="3619226" y="5366092"/>
+            <a:ext cx="1071127" cy="369332"/>
+          </a:xfrm>
+          <a:prstGeom prst="rect">
+            <a:avLst/>
+          </a:prstGeom>
+          <a:noFill/>
+        </p:spPr>
+        <p:txBody>
+          <a:bodyPr wrap="none" rtlCol="0">
+            <a:spAutoFit/>
+          </a:bodyPr>
+          <a:lstStyle/>
+          <a:p>
+            <a:r>
+              <a:rPr lang="fr-FR" dirty="0" err="1" smtClean="0">
+                <a:solidFill>
+                  <a:srgbClr val="00B0F0"/>
+                </a:solidFill>
+                <a:latin typeface="Consolas" charset="0"/>
+                <a:ea typeface="Consolas" charset="0"/>
+                <a:cs typeface="Consolas" charset="0"/>
+              </a:rPr>
+              <a:t>spacing</a:t>
+            </a:r>
+            <a:endParaRPr lang="fr-FR" dirty="0">
+              <a:solidFill>
+                <a:srgbClr val="00B0F0"/>
+              </a:solidFill>
+              <a:latin typeface="Consolas" charset="0"/>
+              <a:ea typeface="Consolas" charset="0"/>
+              <a:cs typeface="Consolas" charset="0"/>
+            </a:endParaRPr>
+          </a:p>
+        </p:txBody>
+      </p:sp>
+      <p:sp>
+        <p:nvSpPr>
+          <p:cNvPr id="100" name="ZoneTexte 99"/>
+          <p:cNvSpPr txBox="1"/>
+          <p:nvPr/>
+        </p:nvSpPr>
+        <p:spPr>
+          <a:xfrm>
+            <a:off x="699145" y="5031842"/>
+            <a:ext cx="817853" cy="369332"/>
+          </a:xfrm>
+          <a:prstGeom prst="rect">
+            <a:avLst/>
+          </a:prstGeom>
+          <a:noFill/>
+        </p:spPr>
+        <p:txBody>
+          <a:bodyPr wrap="none" rtlCol="0">
+            <a:spAutoFit/>
+          </a:bodyPr>
+          <a:lstStyle/>
+          <a:p>
+            <a:r>
+              <a:rPr lang="fr-FR" dirty="0" err="1" smtClean="0">
+                <a:solidFill>
+                  <a:srgbClr val="00B050"/>
+                </a:solidFill>
+                <a:latin typeface="Consolas" charset="0"/>
+                <a:ea typeface="Consolas" charset="0"/>
+                <a:cs typeface="Consolas" charset="0"/>
+              </a:rPr>
+              <a:t>start</a:t>
+            </a:r>
+            <a:endParaRPr lang="fr-FR" dirty="0">
+              <a:solidFill>
+                <a:srgbClr val="00B050"/>
+              </a:solidFill>
+              <a:latin typeface="Consolas" charset="0"/>
+              <a:ea typeface="Consolas" charset="0"/>
+              <a:cs typeface="Consolas" charset="0"/>
+            </a:endParaRPr>
+          </a:p>
+        </p:txBody>
+      </p:sp>
+      <p:cxnSp>
+        <p:nvCxnSpPr>
+          <p:cNvPr id="101" name="Connecteur droit 100"/>
+          <p:cNvCxnSpPr/>
+          <p:nvPr/>
+        </p:nvCxnSpPr>
+        <p:spPr>
+          <a:xfrm>
+            <a:off x="1502446" y="4985106"/>
+            <a:ext cx="0" cy="377143"/>
+          </a:xfrm>
+          <a:prstGeom prst="line">
+            <a:avLst/>
+          </a:prstGeom>
+          <a:ln w="31750">
+            <a:solidFill>
+              <a:srgbClr val="C00000"/>
+            </a:solidFill>
+          </a:ln>
+          <a:effectLst/>
+        </p:spPr>
+        <p:style>
+          <a:lnRef idx="2">
+            <a:schemeClr val="accent1"/>
+          </a:lnRef>
+          <a:fillRef idx="0">
+            <a:schemeClr val="accent1"/>
+          </a:fillRef>
+          <a:effectRef idx="1">
+            <a:schemeClr val="accent1"/>
+          </a:effectRef>
+          <a:fontRef idx="minor">
+            <a:schemeClr val="tx1"/>
+          </a:fontRef>
+        </p:style>
+      </p:cxnSp>
+      <p:cxnSp>
+        <p:nvCxnSpPr>
+          <p:cNvPr id="102" name="Connecteur droit 101"/>
+          <p:cNvCxnSpPr/>
+          <p:nvPr/>
+        </p:nvCxnSpPr>
+        <p:spPr>
+          <a:xfrm>
+            <a:off x="3296150" y="4985106"/>
+            <a:ext cx="0" cy="377143"/>
+          </a:xfrm>
+          <a:prstGeom prst="line">
+            <a:avLst/>
+          </a:prstGeom>
+          <a:ln w="31750">
+            <a:solidFill>
+              <a:srgbClr val="C00000"/>
+            </a:solidFill>
+          </a:ln>
+          <a:effectLst/>
+        </p:spPr>
+        <p:style>
+          <a:lnRef idx="2">
+            <a:schemeClr val="accent1"/>
+          </a:lnRef>
+          <a:fillRef idx="0">
+            <a:schemeClr val="accent1"/>
+          </a:fillRef>
+          <a:effectRef idx="1">
+            <a:schemeClr val="accent1"/>
+          </a:effectRef>
+          <a:fontRef idx="minor">
+            <a:schemeClr val="tx1"/>
+          </a:fontRef>
+        </p:style>
+      </p:cxnSp>
+      <p:cxnSp>
+        <p:nvCxnSpPr>
+          <p:cNvPr id="103" name="Connecteur droit 102"/>
+          <p:cNvCxnSpPr/>
+          <p:nvPr/>
+        </p:nvCxnSpPr>
+        <p:spPr>
+          <a:xfrm>
+            <a:off x="5097926" y="4985106"/>
+            <a:ext cx="0" cy="377143"/>
+          </a:xfrm>
+          <a:prstGeom prst="line">
+            <a:avLst/>
+          </a:prstGeom>
+          <a:ln w="31750">
+            <a:solidFill>
+              <a:srgbClr val="C00000"/>
+            </a:solidFill>
+          </a:ln>
+          <a:effectLst/>
+        </p:spPr>
+        <p:style>
+          <a:lnRef idx="2">
+            <a:schemeClr val="accent1"/>
+          </a:lnRef>
+          <a:fillRef idx="0">
+            <a:schemeClr val="accent1"/>
+          </a:fillRef>
+          <a:effectRef idx="1">
+            <a:schemeClr val="accent1"/>
+          </a:effectRef>
+          <a:fontRef idx="minor">
+            <a:schemeClr val="tx1"/>
+          </a:fontRef>
+        </p:style>
+      </p:cxnSp>
+      <p:cxnSp>
+        <p:nvCxnSpPr>
+          <p:cNvPr id="104" name="Connecteur droit 103"/>
+          <p:cNvCxnSpPr/>
+          <p:nvPr/>
+        </p:nvCxnSpPr>
+        <p:spPr>
+          <a:xfrm>
+            <a:off x="6891630" y="4985106"/>
+            <a:ext cx="0" cy="377143"/>
+          </a:xfrm>
+          <a:prstGeom prst="line">
+            <a:avLst/>
+          </a:prstGeom>
+          <a:ln w="31750">
+            <a:solidFill>
+              <a:srgbClr val="C00000"/>
+            </a:solidFill>
+          </a:ln>
+          <a:effectLst/>
+        </p:spPr>
+        <p:style>
+          <a:lnRef idx="2">
+            <a:schemeClr val="accent1"/>
+          </a:lnRef>
+          <a:fillRef idx="0">
+            <a:schemeClr val="accent1"/>
+          </a:fillRef>
+          <a:effectRef idx="1">
+            <a:schemeClr val="accent1"/>
+          </a:effectRef>
+          <a:fontRef idx="minor">
+            <a:schemeClr val="tx1"/>
+          </a:fontRef>
+        </p:style>
+      </p:cxnSp>
+      <p:sp>
+        <p:nvSpPr>
+          <p:cNvPr id="106" name="ZoneTexte 105"/>
+          <p:cNvSpPr txBox="1"/>
+          <p:nvPr/>
+        </p:nvSpPr>
+        <p:spPr>
+          <a:xfrm>
+            <a:off x="1943822" y="4882771"/>
+            <a:ext cx="944489" cy="369332"/>
+          </a:xfrm>
+          <a:prstGeom prst="rect">
+            <a:avLst/>
+          </a:prstGeom>
+          <a:noFill/>
+        </p:spPr>
+        <p:txBody>
+          <a:bodyPr wrap="none" rtlCol="0">
+            <a:spAutoFit/>
+          </a:bodyPr>
+          <a:lstStyle/>
+          <a:p>
+            <a:r>
+              <a:rPr lang="fr-FR" dirty="0" err="1" smtClean="0">
+                <a:solidFill>
+                  <a:srgbClr val="0070C0"/>
+                </a:solidFill>
+                <a:latin typeface="Consolas" charset="0"/>
+                <a:ea typeface="Consolas" charset="0"/>
+                <a:cs typeface="Consolas" charset="0"/>
+              </a:rPr>
+              <a:t>period</a:t>
+            </a:r>
+            <a:endParaRPr lang="fr-FR" dirty="0">
+              <a:solidFill>
+                <a:srgbClr val="0070C0"/>
+              </a:solidFill>
+              <a:latin typeface="Consolas" charset="0"/>
+              <a:ea typeface="Consolas" charset="0"/>
+              <a:cs typeface="Consolas" charset="0"/>
+            </a:endParaRPr>
+          </a:p>
+        </p:txBody>
+      </p:sp>
+      <p:cxnSp>
+        <p:nvCxnSpPr>
+          <p:cNvPr id="107" name="Connecteur droit avec flèche 106"/>
+          <p:cNvCxnSpPr/>
+          <p:nvPr/>
+        </p:nvCxnSpPr>
+        <p:spPr>
+          <a:xfrm flipV="1">
+            <a:off x="709368" y="5068921"/>
+            <a:ext cx="781830" cy="1960"/>
+          </a:xfrm>
+          <a:prstGeom prst="straightConnector1">
+            <a:avLst/>
+          </a:prstGeom>
+          <a:ln w="31750">
+            <a:solidFill>
+              <a:srgbClr val="00B050"/>
+            </a:solidFill>
+            <a:headEnd type="triangle" w="med" len="med"/>
+            <a:tailEnd type="triangle" w="med" len="med"/>
+          </a:ln>
+          <a:effectLst/>
+        </p:spPr>
+        <p:style>
+          <a:lnRef idx="2">
+            <a:schemeClr val="accent1"/>
+          </a:lnRef>
+          <a:fillRef idx="0">
+            <a:schemeClr val="accent1"/>
+          </a:fillRef>
+          <a:effectRef idx="1">
+            <a:schemeClr val="accent1"/>
+          </a:effectRef>
+          <a:fontRef idx="minor">
+            <a:schemeClr val="tx1"/>
+          </a:fontRef>
+        </p:style>
+      </p:cxnSp>
+      <p:cxnSp>
+        <p:nvCxnSpPr>
+          <p:cNvPr id="108" name="Connecteur droit avec flèche 107"/>
+          <p:cNvCxnSpPr/>
+          <p:nvPr/>
+        </p:nvCxnSpPr>
+        <p:spPr>
+          <a:xfrm>
+            <a:off x="709368" y="4859036"/>
+            <a:ext cx="6583382" cy="0"/>
+          </a:xfrm>
+          <a:prstGeom prst="straightConnector1">
+            <a:avLst/>
+          </a:prstGeom>
+          <a:ln w="31750">
+            <a:solidFill>
+              <a:srgbClr val="FF6E00"/>
+            </a:solidFill>
+            <a:headEnd type="stealth"/>
+            <a:tailEnd type="stealth"/>
+          </a:ln>
+          <a:effectLst/>
+        </p:spPr>
+        <p:style>
+          <a:lnRef idx="2">
+            <a:schemeClr val="accent1"/>
+          </a:lnRef>
+          <a:fillRef idx="0">
+            <a:schemeClr val="accent1"/>
+          </a:fillRef>
+          <a:effectRef idx="1">
+            <a:schemeClr val="accent1"/>
+          </a:effectRef>
+          <a:fontRef idx="minor">
+            <a:schemeClr val="tx1"/>
+          </a:fontRef>
+        </p:style>
+      </p:cxnSp>
+      <p:sp>
+        <p:nvSpPr>
+          <p:cNvPr id="109" name="ZoneTexte 108"/>
+          <p:cNvSpPr txBox="1"/>
+          <p:nvPr/>
+        </p:nvSpPr>
+        <p:spPr>
+          <a:xfrm>
+            <a:off x="3863980" y="4812239"/>
+            <a:ext cx="564578" cy="369332"/>
+          </a:xfrm>
+          <a:prstGeom prst="rect">
+            <a:avLst/>
+          </a:prstGeom>
+          <a:noFill/>
+        </p:spPr>
+        <p:txBody>
+          <a:bodyPr wrap="none" rtlCol="0">
+            <a:spAutoFit/>
+          </a:bodyPr>
+          <a:lstStyle/>
+          <a:p>
+            <a:r>
+              <a:rPr lang="fr-FR" smtClean="0">
+                <a:solidFill>
+                  <a:srgbClr val="FF6E00"/>
+                </a:solidFill>
+                <a:latin typeface="Consolas" charset="0"/>
+                <a:ea typeface="Consolas" charset="0"/>
+                <a:cs typeface="Consolas" charset="0"/>
+              </a:rPr>
+              <a:t>end</a:t>
+            </a:r>
+            <a:endParaRPr lang="fr-FR" dirty="0">
+              <a:solidFill>
+                <a:srgbClr val="FF6E00"/>
+              </a:solidFill>
+              <a:latin typeface="Consolas" charset="0"/>
+              <a:ea typeface="Consolas" charset="0"/>
+              <a:cs typeface="Consolas" charset="0"/>
+            </a:endParaRPr>
+          </a:p>
+        </p:txBody>
+      </p:sp>
+      <p:cxnSp>
+        <p:nvCxnSpPr>
+          <p:cNvPr id="110" name="Connecteur droit 109"/>
+          <p:cNvCxnSpPr/>
+          <p:nvPr/>
+        </p:nvCxnSpPr>
+        <p:spPr>
+          <a:xfrm>
+            <a:off x="1622524" y="4984707"/>
+            <a:ext cx="0" cy="377143"/>
+          </a:xfrm>
+          <a:prstGeom prst="line">
+            <a:avLst/>
+          </a:prstGeom>
+          <a:ln w="31750">
+            <a:solidFill>
+              <a:srgbClr val="C00000"/>
+            </a:solidFill>
+          </a:ln>
+          <a:effectLst/>
+        </p:spPr>
+        <p:style>
+          <a:lnRef idx="2">
+            <a:schemeClr val="accent1"/>
+          </a:lnRef>
+          <a:fillRef idx="0">
+            <a:schemeClr val="accent1"/>
+          </a:fillRef>
+          <a:effectRef idx="1">
+            <a:schemeClr val="accent1"/>
+          </a:effectRef>
+          <a:fontRef idx="minor">
+            <a:schemeClr val="tx1"/>
+          </a:fontRef>
+        </p:style>
+      </p:cxnSp>
+      <p:cxnSp>
+        <p:nvCxnSpPr>
+          <p:cNvPr id="111" name="Connecteur droit 110"/>
+          <p:cNvCxnSpPr/>
+          <p:nvPr/>
+        </p:nvCxnSpPr>
+        <p:spPr>
+          <a:xfrm>
+            <a:off x="1751774" y="4984707"/>
+            <a:ext cx="0" cy="377143"/>
+          </a:xfrm>
+          <a:prstGeom prst="line">
+            <a:avLst/>
+          </a:prstGeom>
+          <a:ln w="31750">
+            <a:solidFill>
+              <a:srgbClr val="C00000"/>
+            </a:solidFill>
+          </a:ln>
+          <a:effectLst/>
+        </p:spPr>
+        <p:style>
+          <a:lnRef idx="2">
+            <a:schemeClr val="accent1"/>
+          </a:lnRef>
+          <a:fillRef idx="0">
+            <a:schemeClr val="accent1"/>
+          </a:fillRef>
+          <a:effectRef idx="1">
+            <a:schemeClr val="accent1"/>
+          </a:effectRef>
+          <a:fontRef idx="minor">
+            <a:schemeClr val="tx1"/>
+          </a:fontRef>
+        </p:style>
+      </p:cxnSp>
+      <p:sp>
+        <p:nvSpPr>
+          <p:cNvPr id="118" name="Parenthèse ouvrante 117"/>
+          <p:cNvSpPr/>
+          <p:nvPr/>
+        </p:nvSpPr>
+        <p:spPr>
+          <a:xfrm rot="16200000">
+            <a:off x="5188362" y="5189966"/>
+            <a:ext cx="90314" cy="419841"/>
+          </a:xfrm>
+          <a:prstGeom prst="leftBracket">
+            <a:avLst>
+              <a:gd name="adj" fmla="val 64644"/>
+            </a:avLst>
+          </a:prstGeom>
+          <a:ln w="31750">
+            <a:solidFill>
+              <a:srgbClr val="7224B2"/>
+            </a:solidFill>
+          </a:ln>
+          <a:effectLst/>
+        </p:spPr>
+        <p:style>
+          <a:lnRef idx="2">
+            <a:schemeClr val="accent1"/>
+          </a:lnRef>
+          <a:fillRef idx="0">
+            <a:schemeClr val="accent1"/>
+          </a:fillRef>
+          <a:effectRef idx="1">
+            <a:schemeClr val="accent1"/>
+          </a:effectRef>
+          <a:fontRef idx="minor">
+            <a:schemeClr val="tx1"/>
+          </a:fontRef>
+        </p:style>
+        <p:txBody>
+          <a:bodyPr rtlCol="0" anchor="ctr"/>
+          <a:lstStyle/>
+          <a:p>
+            <a:pPr algn="ctr"/>
+            <a:endParaRPr lang="fr-FR" sz="3200"/>
+          </a:p>
+        </p:txBody>
+      </p:sp>
+      <p:sp>
+        <p:nvSpPr>
+          <p:cNvPr id="119" name="ZoneTexte 118"/>
+          <p:cNvSpPr txBox="1"/>
+          <p:nvPr/>
+        </p:nvSpPr>
+        <p:spPr>
+          <a:xfrm>
+            <a:off x="5693661" y="4875457"/>
+            <a:ext cx="944489" cy="646331"/>
+          </a:xfrm>
+          <a:prstGeom prst="rect">
+            <a:avLst/>
+          </a:prstGeom>
+          <a:noFill/>
+        </p:spPr>
+        <p:txBody>
+          <a:bodyPr wrap="none" rtlCol="0">
+            <a:spAutoFit/>
+          </a:bodyPr>
+          <a:lstStyle/>
+          <a:p>
+            <a:r>
+              <a:rPr lang="fr-FR" dirty="0" err="1" smtClean="0">
+                <a:solidFill>
+                  <a:srgbClr val="7224B2"/>
+                </a:solidFill>
+                <a:latin typeface="Consolas" charset="0"/>
+                <a:ea typeface="Consolas" charset="0"/>
+                <a:cs typeface="Consolas" charset="0"/>
+              </a:rPr>
+              <a:t>repeat</a:t>
+            </a:r>
+            <a:endParaRPr lang="fr-FR" dirty="0">
+              <a:solidFill>
+                <a:srgbClr val="7224B2"/>
+              </a:solidFill>
+              <a:latin typeface="Consolas" charset="0"/>
+              <a:ea typeface="Consolas" charset="0"/>
+              <a:cs typeface="Consolas" charset="0"/>
+            </a:endParaRPr>
+          </a:p>
+          <a:p>
+            <a:r>
+              <a:rPr lang="fr-FR" dirty="0" smtClean="0">
+                <a:solidFill>
+                  <a:srgbClr val="7224B2"/>
+                </a:solidFill>
+                <a:latin typeface="Consolas" charset="0"/>
+                <a:ea typeface="Consolas" charset="0"/>
+                <a:cs typeface="Consolas" charset="0"/>
+              </a:rPr>
+              <a:t>(=3)</a:t>
+            </a:r>
+            <a:endParaRPr lang="fr-FR" dirty="0">
+              <a:solidFill>
+                <a:srgbClr val="7224B2"/>
+              </a:solidFill>
+              <a:latin typeface="Consolas" charset="0"/>
+              <a:ea typeface="Consolas" charset="0"/>
+              <a:cs typeface="Consolas" charset="0"/>
+            </a:endParaRPr>
+          </a:p>
+        </p:txBody>
+      </p:sp>
+      <p:cxnSp>
+        <p:nvCxnSpPr>
+          <p:cNvPr id="120" name="Connecteur droit avec flèche 119"/>
+          <p:cNvCxnSpPr/>
+          <p:nvPr/>
+        </p:nvCxnSpPr>
+        <p:spPr>
+          <a:xfrm flipV="1">
+            <a:off x="5502762" y="5205064"/>
+            <a:ext cx="276491" cy="164718"/>
+          </a:xfrm>
+          <a:prstGeom prst="straightConnector1">
+            <a:avLst/>
+          </a:prstGeom>
+          <a:ln w="31750">
+            <a:solidFill>
+              <a:srgbClr val="7224B2"/>
+            </a:solidFill>
+            <a:tailEnd type="triangle" w="med" len="med"/>
+          </a:ln>
+          <a:effectLst/>
+        </p:spPr>
+        <p:style>
+          <a:lnRef idx="2">
+            <a:schemeClr val="accent1"/>
+          </a:lnRef>
+          <a:fillRef idx="0">
+            <a:schemeClr val="accent1"/>
+          </a:fillRef>
+          <a:effectRef idx="1">
+            <a:schemeClr val="accent1"/>
+          </a:effectRef>
+          <a:fontRef idx="minor">
+            <a:schemeClr val="tx1"/>
+          </a:fontRef>
+        </p:style>
+      </p:cxnSp>
+      <p:cxnSp>
+        <p:nvCxnSpPr>
+          <p:cNvPr id="121" name="Connecteur droit 120"/>
+          <p:cNvCxnSpPr/>
+          <p:nvPr/>
+        </p:nvCxnSpPr>
+        <p:spPr>
+          <a:xfrm>
+            <a:off x="3418794" y="4984707"/>
+            <a:ext cx="0" cy="377143"/>
+          </a:xfrm>
+          <a:prstGeom prst="line">
+            <a:avLst/>
+          </a:prstGeom>
+          <a:ln w="31750">
+            <a:solidFill>
+              <a:srgbClr val="C00000"/>
+            </a:solidFill>
+          </a:ln>
+          <a:effectLst/>
+        </p:spPr>
+        <p:style>
+          <a:lnRef idx="2">
+            <a:schemeClr val="accent1"/>
+          </a:lnRef>
+          <a:fillRef idx="0">
+            <a:schemeClr val="accent1"/>
+          </a:fillRef>
+          <a:effectRef idx="1">
+            <a:schemeClr val="accent1"/>
+          </a:effectRef>
+          <a:fontRef idx="minor">
+            <a:schemeClr val="tx1"/>
+          </a:fontRef>
+        </p:style>
+      </p:cxnSp>
+      <p:cxnSp>
+        <p:nvCxnSpPr>
+          <p:cNvPr id="122" name="Connecteur droit 121"/>
+          <p:cNvCxnSpPr/>
+          <p:nvPr/>
+        </p:nvCxnSpPr>
+        <p:spPr>
+          <a:xfrm>
+            <a:off x="3548044" y="4984707"/>
+            <a:ext cx="0" cy="377143"/>
+          </a:xfrm>
+          <a:prstGeom prst="line">
+            <a:avLst/>
+          </a:prstGeom>
+          <a:ln w="31750">
+            <a:solidFill>
+              <a:srgbClr val="C00000"/>
+            </a:solidFill>
+          </a:ln>
+          <a:effectLst/>
+        </p:spPr>
+        <p:style>
+          <a:lnRef idx="2">
+            <a:schemeClr val="accent1"/>
+          </a:lnRef>
+          <a:fillRef idx="0">
+            <a:schemeClr val="accent1"/>
+          </a:fillRef>
+          <a:effectRef idx="1">
+            <a:schemeClr val="accent1"/>
+          </a:effectRef>
+          <a:fontRef idx="minor">
+            <a:schemeClr val="tx1"/>
+          </a:fontRef>
+        </p:style>
+      </p:cxnSp>
+      <p:cxnSp>
+        <p:nvCxnSpPr>
+          <p:cNvPr id="123" name="Connecteur droit 122"/>
+          <p:cNvCxnSpPr/>
+          <p:nvPr/>
+        </p:nvCxnSpPr>
+        <p:spPr>
+          <a:xfrm>
+            <a:off x="5241385" y="4986277"/>
+            <a:ext cx="0" cy="377143"/>
+          </a:xfrm>
+          <a:prstGeom prst="line">
+            <a:avLst/>
+          </a:prstGeom>
+          <a:ln w="31750">
+            <a:solidFill>
+              <a:srgbClr val="C00000"/>
+            </a:solidFill>
+          </a:ln>
+          <a:effectLst/>
+        </p:spPr>
+        <p:style>
+          <a:lnRef idx="2">
+            <a:schemeClr val="accent1"/>
+          </a:lnRef>
+          <a:fillRef idx="0">
+            <a:schemeClr val="accent1"/>
+          </a:fillRef>
+          <a:effectRef idx="1">
+            <a:schemeClr val="accent1"/>
+          </a:effectRef>
+          <a:fontRef idx="minor">
+            <a:schemeClr val="tx1"/>
+          </a:fontRef>
+        </p:style>
+      </p:cxnSp>
+      <p:cxnSp>
+        <p:nvCxnSpPr>
+          <p:cNvPr id="124" name="Connecteur droit 123"/>
+          <p:cNvCxnSpPr/>
+          <p:nvPr/>
+        </p:nvCxnSpPr>
+        <p:spPr>
+          <a:xfrm>
+            <a:off x="5370634" y="4986277"/>
+            <a:ext cx="0" cy="377143"/>
+          </a:xfrm>
+          <a:prstGeom prst="line">
+            <a:avLst/>
+          </a:prstGeom>
+          <a:ln w="31750">
+            <a:solidFill>
+              <a:srgbClr val="C00000"/>
+            </a:solidFill>
+          </a:ln>
+          <a:effectLst/>
+        </p:spPr>
+        <p:style>
+          <a:lnRef idx="2">
+            <a:schemeClr val="accent1"/>
+          </a:lnRef>
+          <a:fillRef idx="0">
+            <a:schemeClr val="accent1"/>
+          </a:fillRef>
+          <a:effectRef idx="1">
+            <a:schemeClr val="accent1"/>
+          </a:effectRef>
+          <a:fontRef idx="minor">
+            <a:schemeClr val="tx1"/>
+          </a:fontRef>
+        </p:style>
+      </p:cxnSp>
+      <p:cxnSp>
+        <p:nvCxnSpPr>
+          <p:cNvPr id="125" name="Connecteur droit 124"/>
+          <p:cNvCxnSpPr/>
+          <p:nvPr/>
+        </p:nvCxnSpPr>
+        <p:spPr>
+          <a:xfrm>
+            <a:off x="7028943" y="4984707"/>
+            <a:ext cx="0" cy="377143"/>
+          </a:xfrm>
+          <a:prstGeom prst="line">
+            <a:avLst/>
+          </a:prstGeom>
+          <a:ln w="31750">
+            <a:solidFill>
+              <a:srgbClr val="C00000"/>
+            </a:solidFill>
+          </a:ln>
+          <a:effectLst/>
+        </p:spPr>
+        <p:style>
+          <a:lnRef idx="2">
+            <a:schemeClr val="accent1"/>
+          </a:lnRef>
+          <a:fillRef idx="0">
+            <a:schemeClr val="accent1"/>
+          </a:fillRef>
+          <a:effectRef idx="1">
+            <a:schemeClr val="accent1"/>
+          </a:effectRef>
+          <a:fontRef idx="minor">
+            <a:schemeClr val="tx1"/>
+          </a:fontRef>
+        </p:style>
+      </p:cxnSp>
+      <p:cxnSp>
+        <p:nvCxnSpPr>
+          <p:cNvPr id="126" name="Connecteur droit 125"/>
+          <p:cNvCxnSpPr/>
+          <p:nvPr/>
+        </p:nvCxnSpPr>
+        <p:spPr>
+          <a:xfrm>
+            <a:off x="7158193" y="4984707"/>
+            <a:ext cx="0" cy="377143"/>
+          </a:xfrm>
+          <a:prstGeom prst="line">
+            <a:avLst/>
+          </a:prstGeom>
+          <a:ln w="31750">
+            <a:solidFill>
+              <a:srgbClr val="C00000"/>
+            </a:solidFill>
+          </a:ln>
+          <a:effectLst/>
+        </p:spPr>
+        <p:style>
+          <a:lnRef idx="2">
+            <a:schemeClr val="accent1"/>
+          </a:lnRef>
+          <a:fillRef idx="0">
+            <a:schemeClr val="accent1"/>
+          </a:fillRef>
+          <a:effectRef idx="1">
+            <a:schemeClr val="accent1"/>
+          </a:effectRef>
+          <a:fontRef idx="minor">
+            <a:schemeClr val="tx1"/>
+          </a:fontRef>
+        </p:style>
+      </p:cxnSp>
+      <p:cxnSp>
+        <p:nvCxnSpPr>
+          <p:cNvPr id="105" name="Connecteur droit avec flèche 104"/>
+          <p:cNvCxnSpPr/>
+          <p:nvPr/>
+        </p:nvCxnSpPr>
+        <p:spPr>
+          <a:xfrm>
+            <a:off x="1502446" y="4937077"/>
+            <a:ext cx="1793704" cy="0"/>
+          </a:xfrm>
+          <a:prstGeom prst="straightConnector1">
+            <a:avLst/>
+          </a:prstGeom>
+          <a:ln w="31750">
+            <a:solidFill>
+              <a:srgbClr val="0070C0"/>
+            </a:solidFill>
+            <a:headEnd type="triangle" w="med" len="med"/>
+            <a:tailEnd type="triangle" w="med" len="med"/>
+          </a:ln>
+          <a:effectLst/>
+        </p:spPr>
+        <p:style>
+          <a:lnRef idx="2">
+            <a:schemeClr val="accent1"/>
+          </a:lnRef>
+          <a:fillRef idx="0">
+            <a:schemeClr val="accent1"/>
+          </a:fillRef>
+          <a:effectRef idx="1">
+            <a:schemeClr val="accent1"/>
+          </a:effectRef>
+          <a:fontRef idx="minor">
+            <a:schemeClr val="tx1"/>
+          </a:fontRef>
+        </p:style>
+      </p:cxnSp>
+      <p:cxnSp>
+        <p:nvCxnSpPr>
+          <p:cNvPr id="128" name="Connecteur droit 127"/>
+          <p:cNvCxnSpPr/>
+          <p:nvPr/>
+        </p:nvCxnSpPr>
+        <p:spPr>
+          <a:xfrm>
+            <a:off x="3422573" y="5354728"/>
+            <a:ext cx="0" cy="427640"/>
+          </a:xfrm>
+          <a:prstGeom prst="line">
+            <a:avLst/>
+          </a:prstGeom>
+          <a:ln w="22225">
+            <a:solidFill>
+              <a:srgbClr val="00B0F0"/>
+            </a:solidFill>
+            <a:prstDash val="sysDot"/>
+          </a:ln>
+          <a:effectLst/>
+        </p:spPr>
+        <p:style>
+          <a:lnRef idx="2">
+            <a:schemeClr val="accent1"/>
+          </a:lnRef>
+          <a:fillRef idx="0">
+            <a:schemeClr val="accent1"/>
+          </a:fillRef>
+          <a:effectRef idx="1">
+            <a:schemeClr val="accent1"/>
+          </a:effectRef>
+          <a:fontRef idx="minor">
+            <a:schemeClr val="tx1"/>
+          </a:fontRef>
+        </p:style>
+      </p:cxnSp>
+      <p:cxnSp>
+        <p:nvCxnSpPr>
+          <p:cNvPr id="129" name="Connecteur droit 128"/>
+          <p:cNvCxnSpPr/>
+          <p:nvPr/>
+        </p:nvCxnSpPr>
+        <p:spPr>
+          <a:xfrm>
+            <a:off x="3544286" y="5354728"/>
+            <a:ext cx="0" cy="427640"/>
+          </a:xfrm>
+          <a:prstGeom prst="line">
+            <a:avLst/>
+          </a:prstGeom>
+          <a:ln w="22225">
+            <a:solidFill>
+              <a:srgbClr val="00B0F0"/>
+            </a:solidFill>
+            <a:prstDash val="sysDot"/>
+          </a:ln>
+          <a:effectLst/>
+        </p:spPr>
+        <p:style>
+          <a:lnRef idx="2">
+            <a:schemeClr val="accent1"/>
+          </a:lnRef>
+          <a:fillRef idx="0">
+            <a:schemeClr val="accent1"/>
+          </a:fillRef>
+          <a:effectRef idx="1">
+            <a:schemeClr val="accent1"/>
+          </a:effectRef>
+          <a:fontRef idx="minor">
+            <a:schemeClr val="tx1"/>
+          </a:fontRef>
+        </p:style>
+      </p:cxnSp>
+      <p:cxnSp>
+        <p:nvCxnSpPr>
+          <p:cNvPr id="131" name="Connecteur droit avec flèche 130"/>
+          <p:cNvCxnSpPr/>
+          <p:nvPr/>
+        </p:nvCxnSpPr>
+        <p:spPr>
+          <a:xfrm>
+            <a:off x="3286978" y="5568547"/>
+            <a:ext cx="129323" cy="0"/>
+          </a:xfrm>
+          <a:prstGeom prst="straightConnector1">
+            <a:avLst/>
+          </a:prstGeom>
+          <a:ln w="22225">
+            <a:solidFill>
+              <a:srgbClr val="00B0F0"/>
+            </a:solidFill>
+            <a:headEnd w="lg" len="lg"/>
+            <a:tailEnd type="triangle" w="lg" len="lg"/>
+          </a:ln>
+          <a:effectLst/>
+        </p:spPr>
+        <p:style>
+          <a:lnRef idx="2">
+            <a:schemeClr val="accent1"/>
+          </a:lnRef>
+          <a:fillRef idx="0">
+            <a:schemeClr val="accent1"/>
+          </a:fillRef>
+          <a:effectRef idx="1">
+            <a:schemeClr val="accent1"/>
+          </a:effectRef>
+          <a:fontRef idx="minor">
+            <a:schemeClr val="tx1"/>
+          </a:fontRef>
+        </p:style>
+      </p:cxnSp>
+      <p:cxnSp>
+        <p:nvCxnSpPr>
+          <p:cNvPr id="132" name="Connecteur droit avec flèche 131"/>
+          <p:cNvCxnSpPr/>
+          <p:nvPr/>
+        </p:nvCxnSpPr>
+        <p:spPr>
+          <a:xfrm flipH="1">
+            <a:off x="3544672" y="5568547"/>
+            <a:ext cx="129323" cy="0"/>
+          </a:xfrm>
+          <a:prstGeom prst="straightConnector1">
+            <a:avLst/>
+          </a:prstGeom>
+          <a:ln w="22225">
+            <a:solidFill>
+              <a:srgbClr val="00B0F0"/>
+            </a:solidFill>
+            <a:headEnd w="lg" len="lg"/>
+            <a:tailEnd type="triangle" w="lg" len="lg"/>
+          </a:ln>
+          <a:effectLst/>
+        </p:spPr>
+        <p:style>
+          <a:lnRef idx="2">
+            <a:schemeClr val="accent1"/>
+          </a:lnRef>
+          <a:fillRef idx="0">
+            <a:schemeClr val="accent1"/>
+          </a:fillRef>
+          <a:effectRef idx="1">
+            <a:schemeClr val="accent1"/>
+          </a:effectRef>
+          <a:fontRef idx="minor">
+            <a:schemeClr val="tx1"/>
+          </a:fontRef>
+        </p:style>
+      </p:cxnSp>
+      <p:sp>
+        <p:nvSpPr>
+          <p:cNvPr id="139" name="ZoneTexte 138"/>
+          <p:cNvSpPr txBox="1"/>
+          <p:nvPr/>
+        </p:nvSpPr>
+        <p:spPr>
+          <a:xfrm>
+            <a:off x="263748" y="1649811"/>
+            <a:ext cx="346570" cy="584775"/>
+          </a:xfrm>
+          <a:prstGeom prst="rect">
+            <a:avLst/>
+          </a:prstGeom>
+          <a:noFill/>
+        </p:spPr>
+        <p:txBody>
+          <a:bodyPr wrap="none" rtlCol="0">
+            <a:spAutoFit/>
+          </a:bodyPr>
+          <a:lstStyle/>
+          <a:p>
+            <a:r>
+              <a:rPr lang="fr-FR" sz="3200" b="1" dirty="0" smtClean="0">
+                <a:solidFill>
+                  <a:srgbClr val="4F92A1"/>
+                </a:solidFill>
+                <a:latin typeface="Garamond" charset="0"/>
+                <a:ea typeface="Garamond" charset="0"/>
+                <a:cs typeface="Garamond" charset="0"/>
+              </a:rPr>
+              <a:t>1</a:t>
+            </a:r>
+            <a:endParaRPr lang="fr-FR" sz="3200" b="1" dirty="0">
+              <a:solidFill>
+                <a:srgbClr val="4F92A1"/>
+              </a:solidFill>
+              <a:latin typeface="Garamond" charset="0"/>
+              <a:ea typeface="Garamond" charset="0"/>
+              <a:cs typeface="Garamond" charset="0"/>
+            </a:endParaRPr>
+          </a:p>
+        </p:txBody>
+      </p:sp>
+      <p:sp>
+        <p:nvSpPr>
+          <p:cNvPr id="140" name="ZoneTexte 139"/>
+          <p:cNvSpPr txBox="1"/>
+          <p:nvPr/>
+        </p:nvSpPr>
+        <p:spPr>
+          <a:xfrm>
+            <a:off x="246333" y="2394953"/>
+            <a:ext cx="377026" cy="584775"/>
+          </a:xfrm>
+          <a:prstGeom prst="rect">
+            <a:avLst/>
+          </a:prstGeom>
+          <a:noFill/>
+        </p:spPr>
+        <p:txBody>
+          <a:bodyPr wrap="none" rtlCol="0">
+            <a:spAutoFit/>
+          </a:bodyPr>
+          <a:lstStyle/>
+          <a:p>
+            <a:r>
+              <a:rPr lang="fr-FR" sz="3200" b="1" dirty="0" smtClean="0">
+                <a:solidFill>
+                  <a:srgbClr val="4F92A1"/>
+                </a:solidFill>
+                <a:latin typeface="Garamond" charset="0"/>
+                <a:ea typeface="Garamond" charset="0"/>
+                <a:cs typeface="Garamond" charset="0"/>
+              </a:rPr>
+              <a:t>2</a:t>
+            </a:r>
+            <a:endParaRPr lang="fr-FR" sz="3200" b="1" dirty="0">
+              <a:solidFill>
+                <a:srgbClr val="4F92A1"/>
+              </a:solidFill>
+              <a:latin typeface="Garamond" charset="0"/>
+              <a:ea typeface="Garamond" charset="0"/>
+              <a:cs typeface="Garamond" charset="0"/>
+            </a:endParaRPr>
+          </a:p>
+        </p:txBody>
+      </p:sp>
+      <p:sp>
+        <p:nvSpPr>
+          <p:cNvPr id="141" name="ZoneTexte 140"/>
+          <p:cNvSpPr txBox="1"/>
+          <p:nvPr/>
+        </p:nvSpPr>
+        <p:spPr>
+          <a:xfrm>
+            <a:off x="246333" y="3209410"/>
+            <a:ext cx="377026" cy="584775"/>
+          </a:xfrm>
+          <a:prstGeom prst="rect">
+            <a:avLst/>
+          </a:prstGeom>
+          <a:noFill/>
+        </p:spPr>
+        <p:txBody>
+          <a:bodyPr wrap="none" rtlCol="0">
+            <a:spAutoFit/>
+          </a:bodyPr>
+          <a:lstStyle/>
+          <a:p>
+            <a:r>
+              <a:rPr lang="fr-FR" sz="3200" b="1" dirty="0" smtClean="0">
+                <a:solidFill>
+                  <a:srgbClr val="4F92A1"/>
+                </a:solidFill>
+                <a:latin typeface="Garamond" charset="0"/>
+                <a:ea typeface="Garamond" charset="0"/>
+                <a:cs typeface="Garamond" charset="0"/>
+              </a:rPr>
+              <a:t>3</a:t>
+            </a:r>
+            <a:endParaRPr lang="fr-FR" sz="3200" b="1" dirty="0">
+              <a:solidFill>
+                <a:srgbClr val="4F92A1"/>
+              </a:solidFill>
+              <a:latin typeface="Garamond" charset="0"/>
+              <a:ea typeface="Garamond" charset="0"/>
+              <a:cs typeface="Garamond" charset="0"/>
+            </a:endParaRPr>
+          </a:p>
+        </p:txBody>
+      </p:sp>
+      <p:sp>
+        <p:nvSpPr>
+          <p:cNvPr id="142" name="ZoneTexte 141"/>
+          <p:cNvSpPr txBox="1"/>
+          <p:nvPr/>
+        </p:nvSpPr>
+        <p:spPr>
+          <a:xfrm>
+            <a:off x="260193" y="4023866"/>
+            <a:ext cx="377026" cy="584775"/>
+          </a:xfrm>
+          <a:prstGeom prst="rect">
+            <a:avLst/>
+          </a:prstGeom>
+          <a:noFill/>
+        </p:spPr>
+        <p:txBody>
+          <a:bodyPr wrap="none" rtlCol="0">
+            <a:spAutoFit/>
+          </a:bodyPr>
+          <a:lstStyle/>
+          <a:p>
+            <a:r>
+              <a:rPr lang="fr-FR" sz="3200" b="1" dirty="0" smtClean="0">
+                <a:solidFill>
+                  <a:srgbClr val="4F92A1"/>
+                </a:solidFill>
+                <a:latin typeface="Garamond" charset="0"/>
+                <a:ea typeface="Garamond" charset="0"/>
+                <a:cs typeface="Garamond" charset="0"/>
+              </a:rPr>
+              <a:t>4</a:t>
+            </a:r>
+            <a:endParaRPr lang="fr-FR" sz="3200" b="1" dirty="0">
+              <a:solidFill>
+                <a:srgbClr val="4F92A1"/>
+              </a:solidFill>
+              <a:latin typeface="Garamond" charset="0"/>
+              <a:ea typeface="Garamond" charset="0"/>
+              <a:cs typeface="Garamond" charset="0"/>
+            </a:endParaRPr>
+          </a:p>
+        </p:txBody>
+      </p:sp>
+      <p:sp>
+        <p:nvSpPr>
+          <p:cNvPr id="143" name="ZoneTexte 142"/>
+          <p:cNvSpPr txBox="1"/>
+          <p:nvPr/>
+        </p:nvSpPr>
+        <p:spPr>
+          <a:xfrm>
+            <a:off x="264937" y="4865048"/>
+            <a:ext cx="377026" cy="584775"/>
+          </a:xfrm>
+          <a:prstGeom prst="rect">
+            <a:avLst/>
+          </a:prstGeom>
+          <a:noFill/>
+        </p:spPr>
+        <p:txBody>
+          <a:bodyPr wrap="none" rtlCol="0">
+            <a:spAutoFit/>
+          </a:bodyPr>
+          <a:lstStyle/>
+          <a:p>
+            <a:r>
+              <a:rPr lang="fr-FR" sz="3200" b="1" dirty="0" smtClean="0">
+                <a:solidFill>
+                  <a:srgbClr val="4F92A1"/>
+                </a:solidFill>
+                <a:latin typeface="Garamond" charset="0"/>
+                <a:ea typeface="Garamond" charset="0"/>
+                <a:cs typeface="Garamond" charset="0"/>
+              </a:rPr>
+              <a:t>5</a:t>
+            </a:r>
+            <a:endParaRPr lang="fr-FR" sz="3200" b="1" dirty="0">
+              <a:solidFill>
+                <a:srgbClr val="4F92A1"/>
+              </a:solidFill>
+              <a:latin typeface="Garamond" charset="0"/>
+              <a:ea typeface="Garamond" charset="0"/>
+              <a:cs typeface="Garamond" charset="0"/>
+            </a:endParaRPr>
+          </a:p>
+        </p:txBody>
+      </p:sp>
+    </p:spTree>
+    <p:extLst>
+      <p:ext uri="{BB962C8B-B14F-4D97-AF65-F5344CB8AC3E}">
+        <p14:creationId xmlns:p14="http://schemas.microsoft.com/office/powerpoint/2010/main" val="164803608"/>
+      </p:ext>
+    </p:extLst>
+  </p:cSld>
+  <p:clrMapOvr>
+    <a:masterClrMapping/>
+  </p:clrMapOvr>
+</p:sld>
+</file>
+
 <file path=ppt/theme/theme1.xml><?xml version="1.0" encoding="utf-8"?>
 <a:theme xmlns:a="http://schemas.openxmlformats.org/drawingml/2006/main" name="Thème Office">
   <a:themeElements>

</xml_diff>